<commit_message>
Update generated slides.pptx with presenter notes
</commit_message>
<xml_diff>
--- a/output/slides.pptx
+++ b/output/slides.pptx
@@ -4,6 +4,9 @@
   <p:sldMasterIdLst>
     <p:sldMasterId id="2147483648" r:id="rId1"/>
   </p:sldMasterIdLst>
+  <p:notesMasterIdLst>
+    <p:notesMasterId r:id="rId29"/>
+  </p:notesMasterIdLst>
   <p:sldIdLst>
     <p:sldId id="256" r:id="rId2"/>
     <p:sldId id="257" r:id="rId3"/>
@@ -29,6 +32,9 @@
     <p:sldId id="277" r:id="rId23"/>
     <p:sldId id="278" r:id="rId24"/>
     <p:sldId id="279" r:id="rId25"/>
+    <p:sldId id="280" r:id="rId26"/>
+    <p:sldId id="281" r:id="rId27"/>
+    <p:sldId id="282" r:id="rId28"/>
   </p:sldIdLst>
   <p:sldSz cx="9144000" cy="5143500" type="screen16x9"/>
   <p:notesSz cx="6858000" cy="9144000"/>
@@ -144,6 +150,2251 @@
     </p:ext>
   </p:extLst>
 </p:presentation>
+</file>
+
+<file path=ppt/notesMasters/notesMaster1.xml><?xml version="1.0" encoding="utf-8"?>
+<p:notesMaster xmlns:a="http://schemas.openxmlformats.org/drawingml/2006/main" xmlns:r="http://schemas.openxmlformats.org/officeDocument/2006/relationships" xmlns:p="http://schemas.openxmlformats.org/presentationml/2006/main">
+  <p:cSld>
+    <p:bg>
+      <p:bgRef idx="1001">
+        <a:schemeClr val="bg1"/>
+      </p:bgRef>
+    </p:bg>
+    <p:spTree>
+      <p:nvGrpSpPr>
+        <p:cNvPr id="1" name=""/>
+        <p:cNvGrpSpPr/>
+        <p:nvPr/>
+      </p:nvGrpSpPr>
+      <p:grpSpPr>
+        <a:xfrm>
+          <a:off x="0" y="0"/>
+          <a:ext cx="0" cy="0"/>
+          <a:chOff x="0" y="0"/>
+          <a:chExt cx="0" cy="0"/>
+        </a:xfrm>
+      </p:grpSpPr>
+      <p:sp>
+        <p:nvSpPr>
+          <p:cNvPr id="2" name="Header Placeholder 1"/>
+          <p:cNvSpPr>
+            <a:spLocks noGrp="1"/>
+          </p:cNvSpPr>
+          <p:nvPr>
+            <p:ph type="hdr" sz="quarter"/>
+          </p:nvPr>
+        </p:nvSpPr>
+        <p:spPr>
+          <a:xfrm>
+            <a:off x="0" y="0"/>
+            <a:ext cx="2971800" cy="458788"/>
+          </a:xfrm>
+          <a:prstGeom prst="rect">
+            <a:avLst/>
+          </a:prstGeom>
+        </p:spPr>
+        <p:txBody>
+          <a:bodyPr vert="horz" lIns="91440" tIns="45720" rIns="91440" bIns="45720" rtlCol="0"/>
+          <a:lstStyle>
+            <a:lvl1pPr algn="l">
+              <a:defRPr sz="1200"/>
+            </a:lvl1pPr>
+          </a:lstStyle>
+          <a:p>
+            <a:endParaRPr lang="en-US"/>
+          </a:p>
+        </p:txBody>
+      </p:sp>
+      <p:sp>
+        <p:nvSpPr>
+          <p:cNvPr id="3" name="Date Placeholder 2"/>
+          <p:cNvSpPr>
+            <a:spLocks noGrp="1"/>
+          </p:cNvSpPr>
+          <p:nvPr>
+            <p:ph type="dt" idx="1"/>
+          </p:nvPr>
+        </p:nvSpPr>
+        <p:spPr>
+          <a:xfrm>
+            <a:off x="3884613" y="0"/>
+            <a:ext cx="2971800" cy="458788"/>
+          </a:xfrm>
+          <a:prstGeom prst="rect">
+            <a:avLst/>
+          </a:prstGeom>
+        </p:spPr>
+        <p:txBody>
+          <a:bodyPr vert="horz" lIns="91440" tIns="45720" rIns="91440" bIns="45720" rtlCol="0"/>
+          <a:lstStyle>
+            <a:lvl1pPr algn="r">
+              <a:defRPr sz="1200"/>
+            </a:lvl1pPr>
+          </a:lstStyle>
+          <a:p>
+            <a:fld id="{0F9C1CCF-B725-44A7-AA57-5E433BD85C9F}" type="datetimeFigureOut">
+              <a:rPr lang="en-US" smtClean="0"/>
+              <a:t>1/2/22</a:t>
+            </a:fld>
+            <a:endParaRPr lang="en-US"/>
+          </a:p>
+        </p:txBody>
+      </p:sp>
+      <p:sp>
+        <p:nvSpPr>
+          <p:cNvPr id="4" name="Slide Image Placeholder 3"/>
+          <p:cNvSpPr>
+            <a:spLocks noGrp="1" noRot="1" noChangeAspect="1"/>
+          </p:cNvSpPr>
+          <p:nvPr>
+            <p:ph type="sldImg" idx="2"/>
+          </p:nvPr>
+        </p:nvSpPr>
+        <p:spPr>
+          <a:xfrm>
+            <a:off x="685800" y="1143000"/>
+            <a:ext cx="5486400" cy="3086100"/>
+          </a:xfrm>
+          <a:prstGeom prst="rect">
+            <a:avLst/>
+          </a:prstGeom>
+          <a:noFill/>
+          <a:ln w="12700">
+            <a:solidFill>
+              <a:prstClr val="black"/>
+            </a:solidFill>
+          </a:ln>
+        </p:spPr>
+        <p:txBody>
+          <a:bodyPr vert="horz" lIns="91440" tIns="45720" rIns="91440" bIns="45720" rtlCol="0" anchor="ctr"/>
+          <a:lstStyle/>
+          <a:p>
+            <a:endParaRPr lang="en-US"/>
+          </a:p>
+        </p:txBody>
+      </p:sp>
+      <p:sp>
+        <p:nvSpPr>
+          <p:cNvPr id="5" name="Notes Placeholder 4"/>
+          <p:cNvSpPr>
+            <a:spLocks noGrp="1"/>
+          </p:cNvSpPr>
+          <p:nvPr>
+            <p:ph type="body" sz="quarter" idx="3"/>
+          </p:nvPr>
+        </p:nvSpPr>
+        <p:spPr>
+          <a:xfrm>
+            <a:off x="685800" y="4400550"/>
+            <a:ext cx="5486400" cy="3600450"/>
+          </a:xfrm>
+          <a:prstGeom prst="rect">
+            <a:avLst/>
+          </a:prstGeom>
+        </p:spPr>
+        <p:txBody>
+          <a:bodyPr vert="horz" lIns="91440" tIns="45720" rIns="91440" bIns="45720" rtlCol="0"/>
+          <a:lstStyle/>
+          <a:p>
+            <a:pPr lvl="0"/>
+            <a:r>
+              <a:rPr lang="en-US"/>
+              <a:t>Click to edit Master text styles</a:t>
+            </a:r>
+          </a:p>
+          <a:p>
+            <a:pPr lvl="1"/>
+            <a:r>
+              <a:rPr lang="en-US"/>
+              <a:t>Second level</a:t>
+            </a:r>
+          </a:p>
+          <a:p>
+            <a:pPr lvl="2"/>
+            <a:r>
+              <a:rPr lang="en-US"/>
+              <a:t>Third level</a:t>
+            </a:r>
+          </a:p>
+          <a:p>
+            <a:pPr lvl="3"/>
+            <a:r>
+              <a:rPr lang="en-US"/>
+              <a:t>Fourth level</a:t>
+            </a:r>
+          </a:p>
+          <a:p>
+            <a:pPr lvl="4"/>
+            <a:r>
+              <a:rPr lang="en-US"/>
+              <a:t>Fifth level</a:t>
+            </a:r>
+          </a:p>
+        </p:txBody>
+      </p:sp>
+      <p:sp>
+        <p:nvSpPr>
+          <p:cNvPr id="6" name="Footer Placeholder 5"/>
+          <p:cNvSpPr>
+            <a:spLocks noGrp="1"/>
+          </p:cNvSpPr>
+          <p:nvPr>
+            <p:ph type="ftr" sz="quarter" idx="4"/>
+          </p:nvPr>
+        </p:nvSpPr>
+        <p:spPr>
+          <a:xfrm>
+            <a:off x="0" y="8685213"/>
+            <a:ext cx="2971800" cy="458787"/>
+          </a:xfrm>
+          <a:prstGeom prst="rect">
+            <a:avLst/>
+          </a:prstGeom>
+        </p:spPr>
+        <p:txBody>
+          <a:bodyPr vert="horz" lIns="91440" tIns="45720" rIns="91440" bIns="45720" rtlCol="0" anchor="b"/>
+          <a:lstStyle>
+            <a:lvl1pPr algn="l">
+              <a:defRPr sz="1200"/>
+            </a:lvl1pPr>
+          </a:lstStyle>
+          <a:p>
+            <a:endParaRPr lang="en-US"/>
+          </a:p>
+        </p:txBody>
+      </p:sp>
+      <p:sp>
+        <p:nvSpPr>
+          <p:cNvPr id="7" name="Slide Number Placeholder 6"/>
+          <p:cNvSpPr>
+            <a:spLocks noGrp="1"/>
+          </p:cNvSpPr>
+          <p:nvPr>
+            <p:ph type="sldNum" sz="quarter" idx="5"/>
+          </p:nvPr>
+        </p:nvSpPr>
+        <p:spPr>
+          <a:xfrm>
+            <a:off x="3884613" y="8685213"/>
+            <a:ext cx="2971800" cy="458787"/>
+          </a:xfrm>
+          <a:prstGeom prst="rect">
+            <a:avLst/>
+          </a:prstGeom>
+        </p:spPr>
+        <p:txBody>
+          <a:bodyPr vert="horz" lIns="91440" tIns="45720" rIns="91440" bIns="45720" rtlCol="0" anchor="b"/>
+          <a:lstStyle>
+            <a:lvl1pPr algn="r">
+              <a:defRPr sz="1200"/>
+            </a:lvl1pPr>
+          </a:lstStyle>
+          <a:p>
+            <a:fld id="{18BDFEC3-8487-43E8-A154-7C12CBC1FFF2}" type="slidenum">
+              <a:rPr lang="en-US" smtClean="0"/>
+              <a:t>‹#›</a:t>
+            </a:fld>
+            <a:endParaRPr lang="en-US"/>
+          </a:p>
+        </p:txBody>
+      </p:sp>
+    </p:spTree>
+    <p:extLst>
+      <p:ext uri="{BB962C8B-B14F-4D97-AF65-F5344CB8AC3E}">
+        <p14:creationId xmlns:p14="http://schemas.microsoft.com/office/powerpoint/2010/main" val="3782709779"/>
+      </p:ext>
+    </p:extLst>
+  </p:cSld>
+  <p:clrMap bg1="lt1" tx1="dk1" bg2="lt2" tx2="dk2" accent1="accent1" accent2="accent2" accent3="accent3" accent4="accent4" accent5="accent5" accent6="accent6" hlink="hlink" folHlink="folHlink"/>
+  <p:notesStyle>
+    <a:lvl1pPr marL="0" algn="l" defTabSz="914400" rtl="0" eaLnBrk="1" latinLnBrk="0" hangingPunct="1">
+      <a:defRPr sz="1200" kern="1200">
+        <a:solidFill>
+          <a:schemeClr val="tx1"/>
+        </a:solidFill>
+        <a:latin typeface="+mn-lt"/>
+        <a:ea typeface="+mn-ea"/>
+        <a:cs typeface="+mn-cs"/>
+      </a:defRPr>
+    </a:lvl1pPr>
+    <a:lvl2pPr marL="457200" algn="l" defTabSz="914400" rtl="0" eaLnBrk="1" latinLnBrk="0" hangingPunct="1">
+      <a:defRPr sz="1200" kern="1200">
+        <a:solidFill>
+          <a:schemeClr val="tx1"/>
+        </a:solidFill>
+        <a:latin typeface="+mn-lt"/>
+        <a:ea typeface="+mn-ea"/>
+        <a:cs typeface="+mn-cs"/>
+      </a:defRPr>
+    </a:lvl2pPr>
+    <a:lvl3pPr marL="914400" algn="l" defTabSz="914400" rtl="0" eaLnBrk="1" latinLnBrk="0" hangingPunct="1">
+      <a:defRPr sz="1200" kern="1200">
+        <a:solidFill>
+          <a:schemeClr val="tx1"/>
+        </a:solidFill>
+        <a:latin typeface="+mn-lt"/>
+        <a:ea typeface="+mn-ea"/>
+        <a:cs typeface="+mn-cs"/>
+      </a:defRPr>
+    </a:lvl3pPr>
+    <a:lvl4pPr marL="1371600" algn="l" defTabSz="914400" rtl="0" eaLnBrk="1" latinLnBrk="0" hangingPunct="1">
+      <a:defRPr sz="1200" kern="1200">
+        <a:solidFill>
+          <a:schemeClr val="tx1"/>
+        </a:solidFill>
+        <a:latin typeface="+mn-lt"/>
+        <a:ea typeface="+mn-ea"/>
+        <a:cs typeface="+mn-cs"/>
+      </a:defRPr>
+    </a:lvl4pPr>
+    <a:lvl5pPr marL="1828800" algn="l" defTabSz="914400" rtl="0" eaLnBrk="1" latinLnBrk="0" hangingPunct="1">
+      <a:defRPr sz="1200" kern="1200">
+        <a:solidFill>
+          <a:schemeClr val="tx1"/>
+        </a:solidFill>
+        <a:latin typeface="+mn-lt"/>
+        <a:ea typeface="+mn-ea"/>
+        <a:cs typeface="+mn-cs"/>
+      </a:defRPr>
+    </a:lvl5pPr>
+    <a:lvl6pPr marL="2286000" algn="l" defTabSz="914400" rtl="0" eaLnBrk="1" latinLnBrk="0" hangingPunct="1">
+      <a:defRPr sz="1200" kern="1200">
+        <a:solidFill>
+          <a:schemeClr val="tx1"/>
+        </a:solidFill>
+        <a:latin typeface="+mn-lt"/>
+        <a:ea typeface="+mn-ea"/>
+        <a:cs typeface="+mn-cs"/>
+      </a:defRPr>
+    </a:lvl6pPr>
+    <a:lvl7pPr marL="2743200" algn="l" defTabSz="914400" rtl="0" eaLnBrk="1" latinLnBrk="0" hangingPunct="1">
+      <a:defRPr sz="1200" kern="1200">
+        <a:solidFill>
+          <a:schemeClr val="tx1"/>
+        </a:solidFill>
+        <a:latin typeface="+mn-lt"/>
+        <a:ea typeface="+mn-ea"/>
+        <a:cs typeface="+mn-cs"/>
+      </a:defRPr>
+    </a:lvl7pPr>
+    <a:lvl8pPr marL="3200400" algn="l" defTabSz="914400" rtl="0" eaLnBrk="1" latinLnBrk="0" hangingPunct="1">
+      <a:defRPr sz="1200" kern="1200">
+        <a:solidFill>
+          <a:schemeClr val="tx1"/>
+        </a:solidFill>
+        <a:latin typeface="+mn-lt"/>
+        <a:ea typeface="+mn-ea"/>
+        <a:cs typeface="+mn-cs"/>
+      </a:defRPr>
+    </a:lvl8pPr>
+    <a:lvl9pPr marL="3657600" algn="l" defTabSz="914400" rtl="0" eaLnBrk="1" latinLnBrk="0" hangingPunct="1">
+      <a:defRPr sz="1200" kern="1200">
+        <a:solidFill>
+          <a:schemeClr val="tx1"/>
+        </a:solidFill>
+        <a:latin typeface="+mn-lt"/>
+        <a:ea typeface="+mn-ea"/>
+        <a:cs typeface="+mn-cs"/>
+      </a:defRPr>
+    </a:lvl9pPr>
+  </p:notesStyle>
+</p:notesMaster>
+</file>
+
+<file path=ppt/notesSlides/notesSlide1.xml><?xml version="1.0" encoding="utf-8"?>
+<p:notes xmlns:a="http://schemas.openxmlformats.org/drawingml/2006/main" xmlns:r="http://schemas.openxmlformats.org/officeDocument/2006/relationships" xmlns:p="http://schemas.openxmlformats.org/presentationml/2006/main">
+  <p:cSld>
+    <p:spTree>
+      <p:nvGrpSpPr>
+        <p:cNvPr id="1" name=""/>
+        <p:cNvGrpSpPr/>
+        <p:nvPr/>
+      </p:nvGrpSpPr>
+      <p:grpSpPr>
+        <a:xfrm>
+          <a:off x="0" y="0"/>
+          <a:ext cx="0" cy="0"/>
+          <a:chOff x="0" y="0"/>
+          <a:chExt cx="0" cy="0"/>
+        </a:xfrm>
+      </p:grpSpPr>
+      <p:sp>
+        <p:nvSpPr>
+          <p:cNvPr id="2" name="Slide Image Placeholder 1"/>
+          <p:cNvSpPr>
+            <a:spLocks noGrp="1" noRot="1" noChangeAspect="1"/>
+          </p:cNvSpPr>
+          <p:nvPr>
+            <p:ph type="sldImg"/>
+          </p:nvPr>
+        </p:nvSpPr>
+        <p:spPr/>
+      </p:sp>
+      <p:sp>
+        <p:nvSpPr>
+          <p:cNvPr id="3" name="Notes Placeholder 2"/>
+          <p:cNvSpPr>
+            <a:spLocks noGrp="1"/>
+          </p:cNvSpPr>
+          <p:nvPr>
+            <p:ph type="body" idx="1"/>
+          </p:nvPr>
+        </p:nvSpPr>
+        <p:spPr/>
+        <p:txBody>
+          <a:bodyPr/>
+          <a:lstStyle/>
+          <a:p>
+            <a:pPr lvl="0" indent="0" marL="0">
+              <a:buNone/>
+            </a:pPr>
+            <a:r>
+              <a:rPr/>
+              <a:t>이 슬라이드는 발표 시작용 표지입니다. 간단한 인사와 발표 목적(데이터 탐색 및 시각화 결과 공유)을 말하면 좋습니다. 발표 시간과 청중 수준을 고려해 핵심 메시지를 미리 안내하세요.</a:t>
+            </a:r>
+          </a:p>
+        </p:txBody>
+      </p:sp>
+      <p:sp>
+        <p:nvSpPr>
+          <p:cNvPr id="4" name="Slide Number Placeholder 3"/>
+          <p:cNvSpPr>
+            <a:spLocks noGrp="1"/>
+          </p:cNvSpPr>
+          <p:nvPr>
+            <p:ph type="sldNum" sz="quarter" idx="10"/>
+          </p:nvPr>
+        </p:nvSpPr>
+        <p:spPr/>
+        <p:txBody>
+          <a:bodyPr/>
+          <a:lstStyle/>
+          <a:p>
+            <a:fld id="{18BDFEC3-8487-43E8-A154-7C12CBC1FFF2}" type="slidenum">
+              <a:rPr lang="en-US"/>
+              <a:t>2</a:t>
+            </a:fld>
+            <a:endParaRPr lang="en-US"/>
+          </a:p>
+        </p:txBody>
+      </p:sp>
+    </p:spTree>
+  </p:cSld>
+</p:notes>
+</file>
+
+<file path=ppt/notesSlides/notesSlide10.xml><?xml version="1.0" encoding="utf-8"?>
+<p:notes xmlns:a="http://schemas.openxmlformats.org/drawingml/2006/main" xmlns:r="http://schemas.openxmlformats.org/officeDocument/2006/relationships" xmlns:p="http://schemas.openxmlformats.org/presentationml/2006/main">
+  <p:cSld>
+    <p:spTree>
+      <p:nvGrpSpPr>
+        <p:cNvPr id="1" name=""/>
+        <p:cNvGrpSpPr/>
+        <p:nvPr/>
+      </p:nvGrpSpPr>
+      <p:grpSpPr>
+        <a:xfrm>
+          <a:off x="0" y="0"/>
+          <a:ext cx="0" cy="0"/>
+          <a:chOff x="0" y="0"/>
+          <a:chExt cx="0" cy="0"/>
+        </a:xfrm>
+      </p:grpSpPr>
+      <p:sp>
+        <p:nvSpPr>
+          <p:cNvPr id="2" name="Slide Image Placeholder 1"/>
+          <p:cNvSpPr>
+            <a:spLocks noGrp="1" noRot="1" noChangeAspect="1"/>
+          </p:cNvSpPr>
+          <p:nvPr>
+            <p:ph type="sldImg"/>
+          </p:nvPr>
+        </p:nvSpPr>
+        <p:spPr/>
+      </p:sp>
+      <p:sp>
+        <p:nvSpPr>
+          <p:cNvPr id="3" name="Notes Placeholder 2"/>
+          <p:cNvSpPr>
+            <a:spLocks noGrp="1"/>
+          </p:cNvSpPr>
+          <p:nvPr>
+            <p:ph type="body" idx="1"/>
+          </p:nvPr>
+        </p:nvSpPr>
+        <p:spPr/>
+        <p:txBody>
+          <a:bodyPr/>
+          <a:lstStyle/>
+          <a:p>
+            <a:pPr lvl="0" indent="0" marL="0">
+              <a:buNone/>
+            </a:pPr>
+            <a:r>
+              <a:rPr/>
+              <a:t>산점도에서 군집을 관찰하여 종별 분포 차이를 설명하세요. 동일 지느러미 길이에서 종별 체중 차이가 있는지, 또는 성별에 따른 분산 차이가 있는지도 언급합니다.</a:t>
+            </a:r>
+          </a:p>
+        </p:txBody>
+      </p:sp>
+      <p:sp>
+        <p:nvSpPr>
+          <p:cNvPr id="4" name="Slide Number Placeholder 3"/>
+          <p:cNvSpPr>
+            <a:spLocks noGrp="1"/>
+          </p:cNvSpPr>
+          <p:nvPr>
+            <p:ph type="sldNum" sz="quarter" idx="10"/>
+          </p:nvPr>
+        </p:nvSpPr>
+        <p:spPr/>
+        <p:txBody>
+          <a:bodyPr/>
+          <a:lstStyle/>
+          <a:p>
+            <a:fld id="{18BDFEC3-8487-43E8-A154-7C12CBC1FFF2}" type="slidenum">
+              <a:rPr lang="en-US"/>
+              <a:t>13</a:t>
+            </a:fld>
+            <a:endParaRPr lang="en-US"/>
+          </a:p>
+        </p:txBody>
+      </p:sp>
+    </p:spTree>
+  </p:cSld>
+</p:notes>
+</file>
+
+<file path=ppt/notesSlides/notesSlide11.xml><?xml version="1.0" encoding="utf-8"?>
+<p:notes xmlns:a="http://schemas.openxmlformats.org/drawingml/2006/main" xmlns:r="http://schemas.openxmlformats.org/officeDocument/2006/relationships" xmlns:p="http://schemas.openxmlformats.org/presentationml/2006/main">
+  <p:cSld>
+    <p:spTree>
+      <p:nvGrpSpPr>
+        <p:cNvPr id="1" name=""/>
+        <p:cNvGrpSpPr/>
+        <p:nvPr/>
+      </p:nvGrpSpPr>
+      <p:grpSpPr>
+        <a:xfrm>
+          <a:off x="0" y="0"/>
+          <a:ext cx="0" cy="0"/>
+          <a:chOff x="0" y="0"/>
+          <a:chExt cx="0" cy="0"/>
+        </a:xfrm>
+      </p:grpSpPr>
+      <p:sp>
+        <p:nvSpPr>
+          <p:cNvPr id="2" name="Slide Image Placeholder 1"/>
+          <p:cNvSpPr>
+            <a:spLocks noGrp="1" noRot="1" noChangeAspect="1"/>
+          </p:cNvSpPr>
+          <p:nvPr>
+            <p:ph type="sldImg"/>
+          </p:nvPr>
+        </p:nvSpPr>
+        <p:spPr/>
+      </p:sp>
+      <p:sp>
+        <p:nvSpPr>
+          <p:cNvPr id="3" name="Notes Placeholder 2"/>
+          <p:cNvSpPr>
+            <a:spLocks noGrp="1"/>
+          </p:cNvSpPr>
+          <p:nvPr>
+            <p:ph type="body" idx="1"/>
+          </p:nvPr>
+        </p:nvSpPr>
+        <p:spPr/>
+        <p:txBody>
+          <a:bodyPr/>
+          <a:lstStyle/>
+          <a:p>
+            <a:pPr lvl="0" indent="0" marL="0">
+              <a:buNone/>
+            </a:pPr>
+            <a:r>
+              <a:rPr/>
+              <a:t>페어플롯은 여러 변수의 결합 분포와 종별 분리를 동시에 보여줍니다. 분류 모델에서 어떤 변수 쌍이 유용한지 요약해 주세요.</a:t>
+            </a:r>
+          </a:p>
+        </p:txBody>
+      </p:sp>
+      <p:sp>
+        <p:nvSpPr>
+          <p:cNvPr id="4" name="Slide Number Placeholder 3"/>
+          <p:cNvSpPr>
+            <a:spLocks noGrp="1"/>
+          </p:cNvSpPr>
+          <p:nvPr>
+            <p:ph type="sldNum" sz="quarter" idx="10"/>
+          </p:nvPr>
+        </p:nvSpPr>
+        <p:spPr/>
+        <p:txBody>
+          <a:bodyPr/>
+          <a:lstStyle/>
+          <a:p>
+            <a:fld id="{18BDFEC3-8487-43E8-A154-7C12CBC1FFF2}" type="slidenum">
+              <a:rPr lang="en-US"/>
+              <a:t>14</a:t>
+            </a:fld>
+            <a:endParaRPr lang="en-US"/>
+          </a:p>
+        </p:txBody>
+      </p:sp>
+    </p:spTree>
+  </p:cSld>
+</p:notes>
+</file>
+
+<file path=ppt/notesSlides/notesSlide12.xml><?xml version="1.0" encoding="utf-8"?>
+<p:notes xmlns:a="http://schemas.openxmlformats.org/drawingml/2006/main" xmlns:r="http://schemas.openxmlformats.org/officeDocument/2006/relationships" xmlns:p="http://schemas.openxmlformats.org/presentationml/2006/main">
+  <p:cSld>
+    <p:spTree>
+      <p:nvGrpSpPr>
+        <p:cNvPr id="1" name=""/>
+        <p:cNvGrpSpPr/>
+        <p:nvPr/>
+      </p:nvGrpSpPr>
+      <p:grpSpPr>
+        <a:xfrm>
+          <a:off x="0" y="0"/>
+          <a:ext cx="0" cy="0"/>
+          <a:chOff x="0" y="0"/>
+          <a:chExt cx="0" cy="0"/>
+        </a:xfrm>
+      </p:grpSpPr>
+      <p:sp>
+        <p:nvSpPr>
+          <p:cNvPr id="2" name="Slide Image Placeholder 1"/>
+          <p:cNvSpPr>
+            <a:spLocks noGrp="1" noRot="1" noChangeAspect="1"/>
+          </p:cNvSpPr>
+          <p:nvPr>
+            <p:ph type="sldImg"/>
+          </p:nvPr>
+        </p:nvSpPr>
+        <p:spPr/>
+      </p:sp>
+      <p:sp>
+        <p:nvSpPr>
+          <p:cNvPr id="3" name="Notes Placeholder 2"/>
+          <p:cNvSpPr>
+            <a:spLocks noGrp="1"/>
+          </p:cNvSpPr>
+          <p:nvPr>
+            <p:ph type="body" idx="1"/>
+          </p:nvPr>
+        </p:nvSpPr>
+        <p:spPr/>
+        <p:txBody>
+          <a:bodyPr/>
+          <a:lstStyle/>
+          <a:p>
+            <a:pPr lvl="0" indent="0" marL="0">
+              <a:buNone/>
+            </a:pPr>
+            <a:r>
+              <a:rPr/>
+              <a:t>박스플롯을 통해 중앙값·사분위수·이상치를 설명하세요. Gentoo의 변동성이 높은 이유로 표본 이질성 가능성을 제시할 수 있습니다.</a:t>
+            </a:r>
+          </a:p>
+        </p:txBody>
+      </p:sp>
+      <p:sp>
+        <p:nvSpPr>
+          <p:cNvPr id="4" name="Slide Number Placeholder 3"/>
+          <p:cNvSpPr>
+            <a:spLocks noGrp="1"/>
+          </p:cNvSpPr>
+          <p:nvPr>
+            <p:ph type="sldNum" sz="quarter" idx="10"/>
+          </p:nvPr>
+        </p:nvSpPr>
+        <p:spPr/>
+        <p:txBody>
+          <a:bodyPr/>
+          <a:lstStyle/>
+          <a:p>
+            <a:fld id="{18BDFEC3-8487-43E8-A154-7C12CBC1FFF2}" type="slidenum">
+              <a:rPr lang="en-US"/>
+              <a:t>15</a:t>
+            </a:fld>
+            <a:endParaRPr lang="en-US"/>
+          </a:p>
+        </p:txBody>
+      </p:sp>
+    </p:spTree>
+  </p:cSld>
+</p:notes>
+</file>
+
+<file path=ppt/notesSlides/notesSlide13.xml><?xml version="1.0" encoding="utf-8"?>
+<p:notes xmlns:a="http://schemas.openxmlformats.org/drawingml/2006/main" xmlns:r="http://schemas.openxmlformats.org/officeDocument/2006/relationships" xmlns:p="http://schemas.openxmlformats.org/presentationml/2006/main">
+  <p:cSld>
+    <p:spTree>
+      <p:nvGrpSpPr>
+        <p:cNvPr id="1" name=""/>
+        <p:cNvGrpSpPr/>
+        <p:nvPr/>
+      </p:nvGrpSpPr>
+      <p:grpSpPr>
+        <a:xfrm>
+          <a:off x="0" y="0"/>
+          <a:ext cx="0" cy="0"/>
+          <a:chOff x="0" y="0"/>
+          <a:chExt cx="0" cy="0"/>
+        </a:xfrm>
+      </p:grpSpPr>
+      <p:sp>
+        <p:nvSpPr>
+          <p:cNvPr id="2" name="Slide Image Placeholder 1"/>
+          <p:cNvSpPr>
+            <a:spLocks noGrp="1" noRot="1" noChangeAspect="1"/>
+          </p:cNvSpPr>
+          <p:nvPr>
+            <p:ph type="sldImg"/>
+          </p:nvPr>
+        </p:nvSpPr>
+        <p:spPr/>
+      </p:sp>
+      <p:sp>
+        <p:nvSpPr>
+          <p:cNvPr id="3" name="Notes Placeholder 2"/>
+          <p:cNvSpPr>
+            <a:spLocks noGrp="1"/>
+          </p:cNvSpPr>
+          <p:nvPr>
+            <p:ph type="body" idx="1"/>
+          </p:nvPr>
+        </p:nvSpPr>
+        <p:spPr/>
+        <p:txBody>
+          <a:bodyPr/>
+          <a:lstStyle/>
+          <a:p>
+            <a:pPr lvl="0" indent="0" marL="0">
+              <a:buNone/>
+            </a:pPr>
+            <a:r>
+              <a:rPr/>
+              <a:t>바이올린 플롯은 분포의 세부 구조를 보여줍니다. 피크의 수와 위치를 보며 개체군 내 이질성 여부를 설명하세요.</a:t>
+            </a:r>
+          </a:p>
+        </p:txBody>
+      </p:sp>
+      <p:sp>
+        <p:nvSpPr>
+          <p:cNvPr id="4" name="Slide Number Placeholder 3"/>
+          <p:cNvSpPr>
+            <a:spLocks noGrp="1"/>
+          </p:cNvSpPr>
+          <p:nvPr>
+            <p:ph type="sldNum" sz="quarter" idx="10"/>
+          </p:nvPr>
+        </p:nvSpPr>
+        <p:spPr/>
+        <p:txBody>
+          <a:bodyPr/>
+          <a:lstStyle/>
+          <a:p>
+            <a:fld id="{18BDFEC3-8487-43E8-A154-7C12CBC1FFF2}" type="slidenum">
+              <a:rPr lang="en-US"/>
+              <a:t>16</a:t>
+            </a:fld>
+            <a:endParaRPr lang="en-US"/>
+          </a:p>
+        </p:txBody>
+      </p:sp>
+    </p:spTree>
+  </p:cSld>
+</p:notes>
+</file>
+
+<file path=ppt/notesSlides/notesSlide14.xml><?xml version="1.0" encoding="utf-8"?>
+<p:notes xmlns:a="http://schemas.openxmlformats.org/drawingml/2006/main" xmlns:r="http://schemas.openxmlformats.org/officeDocument/2006/relationships" xmlns:p="http://schemas.openxmlformats.org/presentationml/2006/main">
+  <p:cSld>
+    <p:spTree>
+      <p:nvGrpSpPr>
+        <p:cNvPr id="1" name=""/>
+        <p:cNvGrpSpPr/>
+        <p:nvPr/>
+      </p:nvGrpSpPr>
+      <p:grpSpPr>
+        <a:xfrm>
+          <a:off x="0" y="0"/>
+          <a:ext cx="0" cy="0"/>
+          <a:chOff x="0" y="0"/>
+          <a:chExt cx="0" cy="0"/>
+        </a:xfrm>
+      </p:grpSpPr>
+      <p:sp>
+        <p:nvSpPr>
+          <p:cNvPr id="2" name="Slide Image Placeholder 1"/>
+          <p:cNvSpPr>
+            <a:spLocks noGrp="1" noRot="1" noChangeAspect="1"/>
+          </p:cNvSpPr>
+          <p:nvPr>
+            <p:ph type="sldImg"/>
+          </p:nvPr>
+        </p:nvSpPr>
+        <p:spPr/>
+      </p:sp>
+      <p:sp>
+        <p:nvSpPr>
+          <p:cNvPr id="3" name="Notes Placeholder 2"/>
+          <p:cNvSpPr>
+            <a:spLocks noGrp="1"/>
+          </p:cNvSpPr>
+          <p:nvPr>
+            <p:ph type="body" idx="1"/>
+          </p:nvPr>
+        </p:nvSpPr>
+        <p:spPr/>
+        <p:txBody>
+          <a:bodyPr/>
+          <a:lstStyle/>
+          <a:p>
+            <a:pPr lvl="0" indent="0" marL="0">
+              <a:buNone/>
+            </a:pPr>
+            <a:r>
+              <a:rPr/>
+              <a:t>샘플 수 불균형은 통계 비교와 분류에 영향을 줍니다. 필요시 가중치 적용이나 재표본추출로 보정하는 방법을 권장하세요.</a:t>
+            </a:r>
+          </a:p>
+        </p:txBody>
+      </p:sp>
+      <p:sp>
+        <p:nvSpPr>
+          <p:cNvPr id="4" name="Slide Number Placeholder 3"/>
+          <p:cNvSpPr>
+            <a:spLocks noGrp="1"/>
+          </p:cNvSpPr>
+          <p:nvPr>
+            <p:ph type="sldNum" sz="quarter" idx="10"/>
+          </p:nvPr>
+        </p:nvSpPr>
+        <p:spPr/>
+        <p:txBody>
+          <a:bodyPr/>
+          <a:lstStyle/>
+          <a:p>
+            <a:fld id="{18BDFEC3-8487-43E8-A154-7C12CBC1FFF2}" type="slidenum">
+              <a:rPr lang="en-US"/>
+              <a:t>17</a:t>
+            </a:fld>
+            <a:endParaRPr lang="en-US"/>
+          </a:p>
+        </p:txBody>
+      </p:sp>
+    </p:spTree>
+  </p:cSld>
+</p:notes>
+</file>
+
+<file path=ppt/notesSlides/notesSlide15.xml><?xml version="1.0" encoding="utf-8"?>
+<p:notes xmlns:a="http://schemas.openxmlformats.org/drawingml/2006/main" xmlns:r="http://schemas.openxmlformats.org/officeDocument/2006/relationships" xmlns:p="http://schemas.openxmlformats.org/presentationml/2006/main">
+  <p:cSld>
+    <p:spTree>
+      <p:nvGrpSpPr>
+        <p:cNvPr id="1" name=""/>
+        <p:cNvGrpSpPr/>
+        <p:nvPr/>
+      </p:nvGrpSpPr>
+      <p:grpSpPr>
+        <a:xfrm>
+          <a:off x="0" y="0"/>
+          <a:ext cx="0" cy="0"/>
+          <a:chOff x="0" y="0"/>
+          <a:chExt cx="0" cy="0"/>
+        </a:xfrm>
+      </p:grpSpPr>
+      <p:sp>
+        <p:nvSpPr>
+          <p:cNvPr id="2" name="Slide Image Placeholder 1"/>
+          <p:cNvSpPr>
+            <a:spLocks noGrp="1" noRot="1" noChangeAspect="1"/>
+          </p:cNvSpPr>
+          <p:nvPr>
+            <p:ph type="sldImg"/>
+          </p:nvPr>
+        </p:nvSpPr>
+        <p:spPr/>
+      </p:sp>
+      <p:sp>
+        <p:nvSpPr>
+          <p:cNvPr id="3" name="Notes Placeholder 2"/>
+          <p:cNvSpPr>
+            <a:spLocks noGrp="1"/>
+          </p:cNvSpPr>
+          <p:nvPr>
+            <p:ph type="body" idx="1"/>
+          </p:nvPr>
+        </p:nvSpPr>
+        <p:spPr/>
+        <p:txBody>
+          <a:bodyPr/>
+          <a:lstStyle/>
+          <a:p>
+            <a:pPr lvl="0" indent="0" marL="0">
+              <a:buNone/>
+            </a:pPr>
+            <a:r>
+              <a:rPr/>
+              <a:t>섬 간 차이를 설명하며 생태적 요인(먹이, 기후, 경쟁 등)을 원인으로 추정해 후속 조사를 권장하세요.</a:t>
+            </a:r>
+          </a:p>
+        </p:txBody>
+      </p:sp>
+      <p:sp>
+        <p:nvSpPr>
+          <p:cNvPr id="4" name="Slide Number Placeholder 3"/>
+          <p:cNvSpPr>
+            <a:spLocks noGrp="1"/>
+          </p:cNvSpPr>
+          <p:nvPr>
+            <p:ph type="sldNum" sz="quarter" idx="10"/>
+          </p:nvPr>
+        </p:nvSpPr>
+        <p:spPr/>
+        <p:txBody>
+          <a:bodyPr/>
+          <a:lstStyle/>
+          <a:p>
+            <a:fld id="{18BDFEC3-8487-43E8-A154-7C12CBC1FFF2}" type="slidenum">
+              <a:rPr lang="en-US"/>
+              <a:t>18</a:t>
+            </a:fld>
+            <a:endParaRPr lang="en-US"/>
+          </a:p>
+        </p:txBody>
+      </p:sp>
+    </p:spTree>
+  </p:cSld>
+</p:notes>
+</file>
+
+<file path=ppt/notesSlides/notesSlide16.xml><?xml version="1.0" encoding="utf-8"?>
+<p:notes xmlns:a="http://schemas.openxmlformats.org/drawingml/2006/main" xmlns:r="http://schemas.openxmlformats.org/officeDocument/2006/relationships" xmlns:p="http://schemas.openxmlformats.org/presentationml/2006/main">
+  <p:cSld>
+    <p:spTree>
+      <p:nvGrpSpPr>
+        <p:cNvPr id="1" name=""/>
+        <p:cNvGrpSpPr/>
+        <p:nvPr/>
+      </p:nvGrpSpPr>
+      <p:grpSpPr>
+        <a:xfrm>
+          <a:off x="0" y="0"/>
+          <a:ext cx="0" cy="0"/>
+          <a:chOff x="0" y="0"/>
+          <a:chExt cx="0" cy="0"/>
+        </a:xfrm>
+      </p:grpSpPr>
+      <p:sp>
+        <p:nvSpPr>
+          <p:cNvPr id="2" name="Slide Image Placeholder 1"/>
+          <p:cNvSpPr>
+            <a:spLocks noGrp="1" noRot="1" noChangeAspect="1"/>
+          </p:cNvSpPr>
+          <p:nvPr>
+            <p:ph type="sldImg"/>
+          </p:nvPr>
+        </p:nvSpPr>
+        <p:spPr/>
+      </p:sp>
+      <p:sp>
+        <p:nvSpPr>
+          <p:cNvPr id="3" name="Notes Placeholder 2"/>
+          <p:cNvSpPr>
+            <a:spLocks noGrp="1"/>
+          </p:cNvSpPr>
+          <p:nvPr>
+            <p:ph type="body" idx="1"/>
+          </p:nvPr>
+        </p:nvSpPr>
+        <p:spPr/>
+        <p:txBody>
+          <a:bodyPr/>
+          <a:lstStyle/>
+          <a:p>
+            <a:pPr lvl="0" indent="0" marL="0">
+              <a:buNone/>
+            </a:pPr>
+            <a:r>
+              <a:rPr/>
+              <a:t>스웜플롯은 개체 단위의 분포를 보여주므로 소수의 특이값 식별에 유리합니다. 성별 표기가 있으면 성별 차이도 함께 설명하세요.</a:t>
+            </a:r>
+          </a:p>
+        </p:txBody>
+      </p:sp>
+      <p:sp>
+        <p:nvSpPr>
+          <p:cNvPr id="4" name="Slide Number Placeholder 3"/>
+          <p:cNvSpPr>
+            <a:spLocks noGrp="1"/>
+          </p:cNvSpPr>
+          <p:nvPr>
+            <p:ph type="sldNum" sz="quarter" idx="10"/>
+          </p:nvPr>
+        </p:nvSpPr>
+        <p:spPr/>
+        <p:txBody>
+          <a:bodyPr/>
+          <a:lstStyle/>
+          <a:p>
+            <a:fld id="{18BDFEC3-8487-43E8-A154-7C12CBC1FFF2}" type="slidenum">
+              <a:rPr lang="en-US"/>
+              <a:t>19</a:t>
+            </a:fld>
+            <a:endParaRPr lang="en-US"/>
+          </a:p>
+        </p:txBody>
+      </p:sp>
+    </p:spTree>
+  </p:cSld>
+</p:notes>
+</file>
+
+<file path=ppt/notesSlides/notesSlide17.xml><?xml version="1.0" encoding="utf-8"?>
+<p:notes xmlns:a="http://schemas.openxmlformats.org/drawingml/2006/main" xmlns:r="http://schemas.openxmlformats.org/officeDocument/2006/relationships" xmlns:p="http://schemas.openxmlformats.org/presentationml/2006/main">
+  <p:cSld>
+    <p:spTree>
+      <p:nvGrpSpPr>
+        <p:cNvPr id="1" name=""/>
+        <p:cNvGrpSpPr/>
+        <p:nvPr/>
+      </p:nvGrpSpPr>
+      <p:grpSpPr>
+        <a:xfrm>
+          <a:off x="0" y="0"/>
+          <a:ext cx="0" cy="0"/>
+          <a:chOff x="0" y="0"/>
+          <a:chExt cx="0" cy="0"/>
+        </a:xfrm>
+      </p:grpSpPr>
+      <p:sp>
+        <p:nvSpPr>
+          <p:cNvPr id="2" name="Slide Image Placeholder 1"/>
+          <p:cNvSpPr>
+            <a:spLocks noGrp="1" noRot="1" noChangeAspect="1"/>
+          </p:cNvSpPr>
+          <p:nvPr>
+            <p:ph type="sldImg"/>
+          </p:nvPr>
+        </p:nvSpPr>
+        <p:spPr/>
+      </p:sp>
+      <p:sp>
+        <p:nvSpPr>
+          <p:cNvPr id="3" name="Notes Placeholder 2"/>
+          <p:cNvSpPr>
+            <a:spLocks noGrp="1"/>
+          </p:cNvSpPr>
+          <p:nvPr>
+            <p:ph type="body" idx="1"/>
+          </p:nvPr>
+        </p:nvSpPr>
+        <p:spPr/>
+        <p:txBody>
+          <a:bodyPr/>
+          <a:lstStyle/>
+          <a:p>
+            <a:pPr lvl="0" indent="0" marL="0">
+              <a:buNone/>
+            </a:pPr>
+            <a:r>
+              <a:rPr/>
+              <a:t>KDE에서 피크 위치와 겹침 정도를 설명합니다. 분포가 크게 겹치면 분류에 어려움이 있을 수 있음을 언급하세요.</a:t>
+            </a:r>
+          </a:p>
+        </p:txBody>
+      </p:sp>
+      <p:sp>
+        <p:nvSpPr>
+          <p:cNvPr id="4" name="Slide Number Placeholder 3"/>
+          <p:cNvSpPr>
+            <a:spLocks noGrp="1"/>
+          </p:cNvSpPr>
+          <p:nvPr>
+            <p:ph type="sldNum" sz="quarter" idx="10"/>
+          </p:nvPr>
+        </p:nvSpPr>
+        <p:spPr/>
+        <p:txBody>
+          <a:bodyPr/>
+          <a:lstStyle/>
+          <a:p>
+            <a:fld id="{18BDFEC3-8487-43E8-A154-7C12CBC1FFF2}" type="slidenum">
+              <a:rPr lang="en-US"/>
+              <a:t>20</a:t>
+            </a:fld>
+            <a:endParaRPr lang="en-US"/>
+          </a:p>
+        </p:txBody>
+      </p:sp>
+    </p:spTree>
+  </p:cSld>
+</p:notes>
+</file>
+
+<file path=ppt/notesSlides/notesSlide18.xml><?xml version="1.0" encoding="utf-8"?>
+<p:notes xmlns:a="http://schemas.openxmlformats.org/drawingml/2006/main" xmlns:r="http://schemas.openxmlformats.org/officeDocument/2006/relationships" xmlns:p="http://schemas.openxmlformats.org/presentationml/2006/main">
+  <p:cSld>
+    <p:spTree>
+      <p:nvGrpSpPr>
+        <p:cNvPr id="1" name=""/>
+        <p:cNvGrpSpPr/>
+        <p:nvPr/>
+      </p:nvGrpSpPr>
+      <p:grpSpPr>
+        <a:xfrm>
+          <a:off x="0" y="0"/>
+          <a:ext cx="0" cy="0"/>
+          <a:chOff x="0" y="0"/>
+          <a:chExt cx="0" cy="0"/>
+        </a:xfrm>
+      </p:grpSpPr>
+      <p:sp>
+        <p:nvSpPr>
+          <p:cNvPr id="2" name="Slide Image Placeholder 1"/>
+          <p:cNvSpPr>
+            <a:spLocks noGrp="1" noRot="1" noChangeAspect="1"/>
+          </p:cNvSpPr>
+          <p:nvPr>
+            <p:ph type="sldImg"/>
+          </p:nvPr>
+        </p:nvSpPr>
+        <p:spPr/>
+      </p:sp>
+      <p:sp>
+        <p:nvSpPr>
+          <p:cNvPr id="3" name="Notes Placeholder 2"/>
+          <p:cNvSpPr>
+            <a:spLocks noGrp="1"/>
+          </p:cNvSpPr>
+          <p:nvPr>
+            <p:ph type="body" idx="1"/>
+          </p:nvPr>
+        </p:nvSpPr>
+        <p:spPr/>
+        <p:txBody>
+          <a:bodyPr/>
+          <a:lstStyle/>
+          <a:p>
+            <a:pPr lvl="0" indent="0" marL="0">
+              <a:buNone/>
+            </a:pPr>
+            <a:r>
+              <a:rPr/>
+              <a:t>상관행렬로 변수 간 상관성 수준을 파악하고 다중공선성 가능성을 검토하세요. 회귀/예측 모델 시 변수 선택 기준을 제시하세요.</a:t>
+            </a:r>
+          </a:p>
+        </p:txBody>
+      </p:sp>
+      <p:sp>
+        <p:nvSpPr>
+          <p:cNvPr id="4" name="Slide Number Placeholder 3"/>
+          <p:cNvSpPr>
+            <a:spLocks noGrp="1"/>
+          </p:cNvSpPr>
+          <p:nvPr>
+            <p:ph type="sldNum" sz="quarter" idx="10"/>
+          </p:nvPr>
+        </p:nvSpPr>
+        <p:spPr/>
+        <p:txBody>
+          <a:bodyPr/>
+          <a:lstStyle/>
+          <a:p>
+            <a:fld id="{18BDFEC3-8487-43E8-A154-7C12CBC1FFF2}" type="slidenum">
+              <a:rPr lang="en-US"/>
+              <a:t>21</a:t>
+            </a:fld>
+            <a:endParaRPr lang="en-US"/>
+          </a:p>
+        </p:txBody>
+      </p:sp>
+    </p:spTree>
+  </p:cSld>
+</p:notes>
+</file>
+
+<file path=ppt/notesSlides/notesSlide19.xml><?xml version="1.0" encoding="utf-8"?>
+<p:notes xmlns:a="http://schemas.openxmlformats.org/drawingml/2006/main" xmlns:r="http://schemas.openxmlformats.org/officeDocument/2006/relationships" xmlns:p="http://schemas.openxmlformats.org/presentationml/2006/main">
+  <p:cSld>
+    <p:spTree>
+      <p:nvGrpSpPr>
+        <p:cNvPr id="1" name=""/>
+        <p:cNvGrpSpPr/>
+        <p:nvPr/>
+      </p:nvGrpSpPr>
+      <p:grpSpPr>
+        <a:xfrm>
+          <a:off x="0" y="0"/>
+          <a:ext cx="0" cy="0"/>
+          <a:chOff x="0" y="0"/>
+          <a:chExt cx="0" cy="0"/>
+        </a:xfrm>
+      </p:grpSpPr>
+      <p:sp>
+        <p:nvSpPr>
+          <p:cNvPr id="2" name="Slide Image Placeholder 1"/>
+          <p:cNvSpPr>
+            <a:spLocks noGrp="1" noRot="1" noChangeAspect="1"/>
+          </p:cNvSpPr>
+          <p:nvPr>
+            <p:ph type="sldImg"/>
+          </p:nvPr>
+        </p:nvSpPr>
+        <p:spPr/>
+      </p:sp>
+      <p:sp>
+        <p:nvSpPr>
+          <p:cNvPr id="3" name="Notes Placeholder 2"/>
+          <p:cNvSpPr>
+            <a:spLocks noGrp="1"/>
+          </p:cNvSpPr>
+          <p:nvPr>
+            <p:ph type="body" idx="1"/>
+          </p:nvPr>
+        </p:nvSpPr>
+        <p:spPr/>
+        <p:txBody>
+          <a:bodyPr/>
+          <a:lstStyle/>
+          <a:p>
+            <a:pPr lvl="0" indent="0" marL="0">
+              <a:buNone/>
+            </a:pPr>
+            <a:r>
+              <a:rPr/>
+              <a:t>페싯으로 종별 패턴 차이를 보여줍니다. 어떤 변수 조합에서 종 분리가 잘 되는지 예시를 들어 설명하세요.</a:t>
+            </a:r>
+          </a:p>
+        </p:txBody>
+      </p:sp>
+      <p:sp>
+        <p:nvSpPr>
+          <p:cNvPr id="4" name="Slide Number Placeholder 3"/>
+          <p:cNvSpPr>
+            <a:spLocks noGrp="1"/>
+          </p:cNvSpPr>
+          <p:nvPr>
+            <p:ph type="sldNum" sz="quarter" idx="10"/>
+          </p:nvPr>
+        </p:nvSpPr>
+        <p:spPr/>
+        <p:txBody>
+          <a:bodyPr/>
+          <a:lstStyle/>
+          <a:p>
+            <a:fld id="{18BDFEC3-8487-43E8-A154-7C12CBC1FFF2}" type="slidenum">
+              <a:rPr lang="en-US"/>
+              <a:t>22</a:t>
+            </a:fld>
+            <a:endParaRPr lang="en-US"/>
+          </a:p>
+        </p:txBody>
+      </p:sp>
+    </p:spTree>
+  </p:cSld>
+</p:notes>
+</file>
+
+<file path=ppt/notesSlides/notesSlide2.xml><?xml version="1.0" encoding="utf-8"?>
+<p:notes xmlns:a="http://schemas.openxmlformats.org/drawingml/2006/main" xmlns:r="http://schemas.openxmlformats.org/officeDocument/2006/relationships" xmlns:p="http://schemas.openxmlformats.org/presentationml/2006/main">
+  <p:cSld>
+    <p:spTree>
+      <p:nvGrpSpPr>
+        <p:cNvPr id="1" name=""/>
+        <p:cNvGrpSpPr/>
+        <p:nvPr/>
+      </p:nvGrpSpPr>
+      <p:grpSpPr>
+        <a:xfrm>
+          <a:off x="0" y="0"/>
+          <a:ext cx="0" cy="0"/>
+          <a:chOff x="0" y="0"/>
+          <a:chExt cx="0" cy="0"/>
+        </a:xfrm>
+      </p:grpSpPr>
+      <p:sp>
+        <p:nvSpPr>
+          <p:cNvPr id="2" name="Slide Image Placeholder 1"/>
+          <p:cNvSpPr>
+            <a:spLocks noGrp="1" noRot="1" noChangeAspect="1"/>
+          </p:cNvSpPr>
+          <p:nvPr>
+            <p:ph type="sldImg"/>
+          </p:nvPr>
+        </p:nvSpPr>
+        <p:spPr/>
+      </p:sp>
+      <p:sp>
+        <p:nvSpPr>
+          <p:cNvPr id="3" name="Notes Placeholder 2"/>
+          <p:cNvSpPr>
+            <a:spLocks noGrp="1"/>
+          </p:cNvSpPr>
+          <p:nvPr>
+            <p:ph type="body" idx="1"/>
+          </p:nvPr>
+        </p:nvSpPr>
+        <p:spPr/>
+        <p:txBody>
+          <a:bodyPr/>
+          <a:lstStyle/>
+          <a:p>
+            <a:pPr lvl="0" indent="0" marL="0">
+              <a:buNone/>
+            </a:pPr>
+            <a:r>
+              <a:rPr/>
+              <a:t>청중에게 발표의 흐름을 미리 안내합니다. 각 섹션별로 1문장씩 설명(데이터, 시각화, 인사이트, 권장사항)을 추가하면 이해가 쉬워집니다.</a:t>
+            </a:r>
+          </a:p>
+        </p:txBody>
+      </p:sp>
+      <p:sp>
+        <p:nvSpPr>
+          <p:cNvPr id="4" name="Slide Number Placeholder 3"/>
+          <p:cNvSpPr>
+            <a:spLocks noGrp="1"/>
+          </p:cNvSpPr>
+          <p:nvPr>
+            <p:ph type="sldNum" sz="quarter" idx="10"/>
+          </p:nvPr>
+        </p:nvSpPr>
+        <p:spPr/>
+        <p:txBody>
+          <a:bodyPr/>
+          <a:lstStyle/>
+          <a:p>
+            <a:fld id="{18BDFEC3-8487-43E8-A154-7C12CBC1FFF2}" type="slidenum">
+              <a:rPr lang="en-US"/>
+              <a:t>3</a:t>
+            </a:fld>
+            <a:endParaRPr lang="en-US"/>
+          </a:p>
+        </p:txBody>
+      </p:sp>
+    </p:spTree>
+  </p:cSld>
+</p:notes>
+</file>
+
+<file path=ppt/notesSlides/notesSlide20.xml><?xml version="1.0" encoding="utf-8"?>
+<p:notes xmlns:a="http://schemas.openxmlformats.org/drawingml/2006/main" xmlns:r="http://schemas.openxmlformats.org/officeDocument/2006/relationships" xmlns:p="http://schemas.openxmlformats.org/presentationml/2006/main">
+  <p:cSld>
+    <p:spTree>
+      <p:nvGrpSpPr>
+        <p:cNvPr id="1" name=""/>
+        <p:cNvGrpSpPr/>
+        <p:nvPr/>
+      </p:nvGrpSpPr>
+      <p:grpSpPr>
+        <a:xfrm>
+          <a:off x="0" y="0"/>
+          <a:ext cx="0" cy="0"/>
+          <a:chOff x="0" y="0"/>
+          <a:chExt cx="0" cy="0"/>
+        </a:xfrm>
+      </p:grpSpPr>
+      <p:sp>
+        <p:nvSpPr>
+          <p:cNvPr id="2" name="Slide Image Placeholder 1"/>
+          <p:cNvSpPr>
+            <a:spLocks noGrp="1" noRot="1" noChangeAspect="1"/>
+          </p:cNvSpPr>
+          <p:nvPr>
+            <p:ph type="sldImg"/>
+          </p:nvPr>
+        </p:nvSpPr>
+        <p:spPr/>
+      </p:sp>
+      <p:sp>
+        <p:nvSpPr>
+          <p:cNvPr id="3" name="Notes Placeholder 2"/>
+          <p:cNvSpPr>
+            <a:spLocks noGrp="1"/>
+          </p:cNvSpPr>
+          <p:nvPr>
+            <p:ph type="body" idx="1"/>
+          </p:nvPr>
+        </p:nvSpPr>
+        <p:spPr/>
+        <p:txBody>
+          <a:bodyPr/>
+          <a:lstStyle/>
+          <a:p>
+            <a:pPr lvl="0" indent="0" marL="0">
+              <a:buNone/>
+            </a:pPr>
+            <a:r>
+              <a:rPr/>
+              <a:t>핵심 메시지를 간결하게 요약하고 후속 권장 사항을 명시하세요. 발표 마무리에서 질문 시간을 안내하고, 추가 데이터·코드 접근 위치를 제공하면 좋습니다.</a:t>
+            </a:r>
+          </a:p>
+        </p:txBody>
+      </p:sp>
+      <p:sp>
+        <p:nvSpPr>
+          <p:cNvPr id="4" name="Slide Number Placeholder 3"/>
+          <p:cNvSpPr>
+            <a:spLocks noGrp="1"/>
+          </p:cNvSpPr>
+          <p:nvPr>
+            <p:ph type="sldNum" sz="quarter" idx="10"/>
+          </p:nvPr>
+        </p:nvSpPr>
+        <p:spPr/>
+        <p:txBody>
+          <a:bodyPr/>
+          <a:lstStyle/>
+          <a:p>
+            <a:fld id="{18BDFEC3-8487-43E8-A154-7C12CBC1FFF2}" type="slidenum">
+              <a:rPr lang="en-US"/>
+              <a:t>23</a:t>
+            </a:fld>
+            <a:endParaRPr lang="en-US"/>
+          </a:p>
+        </p:txBody>
+      </p:sp>
+    </p:spTree>
+  </p:cSld>
+</p:notes>
+</file>
+
+<file path=ppt/notesSlides/notesSlide21.xml><?xml version="1.0" encoding="utf-8"?>
+<p:notes xmlns:a="http://schemas.openxmlformats.org/drawingml/2006/main" xmlns:r="http://schemas.openxmlformats.org/officeDocument/2006/relationships" xmlns:p="http://schemas.openxmlformats.org/presentationml/2006/main">
+  <p:cSld>
+    <p:spTree>
+      <p:nvGrpSpPr>
+        <p:cNvPr id="1" name=""/>
+        <p:cNvGrpSpPr/>
+        <p:nvPr/>
+      </p:nvGrpSpPr>
+      <p:grpSpPr>
+        <a:xfrm>
+          <a:off x="0" y="0"/>
+          <a:ext cx="0" cy="0"/>
+          <a:chOff x="0" y="0"/>
+          <a:chExt cx="0" cy="0"/>
+        </a:xfrm>
+      </p:grpSpPr>
+      <p:sp>
+        <p:nvSpPr>
+          <p:cNvPr id="2" name="Slide Image Placeholder 1"/>
+          <p:cNvSpPr>
+            <a:spLocks noGrp="1" noRot="1" noChangeAspect="1"/>
+          </p:cNvSpPr>
+          <p:nvPr>
+            <p:ph type="sldImg"/>
+          </p:nvPr>
+        </p:nvSpPr>
+        <p:spPr/>
+      </p:sp>
+      <p:sp>
+        <p:nvSpPr>
+          <p:cNvPr id="3" name="Notes Placeholder 2"/>
+          <p:cNvSpPr>
+            <a:spLocks noGrp="1"/>
+          </p:cNvSpPr>
+          <p:nvPr>
+            <p:ph type="body" idx="1"/>
+          </p:nvPr>
+        </p:nvSpPr>
+        <p:spPr/>
+        <p:txBody>
+          <a:bodyPr/>
+          <a:lstStyle/>
+          <a:p>
+            <a:pPr lvl="0" indent="0" marL="0">
+              <a:buNone/>
+            </a:pPr>
+            <a:r>
+              <a:rPr/>
+              <a:t>부록에서는 결과물 위치와 파일명을 안내합니다. 필요 시 실행 명령(예: </a:t>
+            </a:r>
+            <a:r>
+              <a:rPr>
+                <a:latin typeface="Courier"/>
+              </a:rPr>
+              <a:t>python analyze_penguins.py</a:t>
+            </a:r>
+            <a:r>
+              <a:rPr/>
+              <a:t>)을 추가하여 재현 가능성을 높이세요.</a:t>
+            </a:r>
+          </a:p>
+        </p:txBody>
+      </p:sp>
+      <p:sp>
+        <p:nvSpPr>
+          <p:cNvPr id="4" name="Slide Number Placeholder 3"/>
+          <p:cNvSpPr>
+            <a:spLocks noGrp="1"/>
+          </p:cNvSpPr>
+          <p:nvPr>
+            <p:ph type="sldNum" sz="quarter" idx="10"/>
+          </p:nvPr>
+        </p:nvSpPr>
+        <p:spPr/>
+        <p:txBody>
+          <a:bodyPr/>
+          <a:lstStyle/>
+          <a:p>
+            <a:fld id="{18BDFEC3-8487-43E8-A154-7C12CBC1FFF2}" type="slidenum">
+              <a:rPr lang="en-US"/>
+              <a:t>24</a:t>
+            </a:fld>
+            <a:endParaRPr lang="en-US"/>
+          </a:p>
+        </p:txBody>
+      </p:sp>
+    </p:spTree>
+  </p:cSld>
+</p:notes>
+</file>
+
+<file path=ppt/notesSlides/notesSlide22.xml><?xml version="1.0" encoding="utf-8"?>
+<p:notes xmlns:a="http://schemas.openxmlformats.org/drawingml/2006/main" xmlns:r="http://schemas.openxmlformats.org/officeDocument/2006/relationships" xmlns:p="http://schemas.openxmlformats.org/presentationml/2006/main">
+  <p:cSld>
+    <p:spTree>
+      <p:nvGrpSpPr>
+        <p:cNvPr id="1" name=""/>
+        <p:cNvGrpSpPr/>
+        <p:nvPr/>
+      </p:nvGrpSpPr>
+      <p:grpSpPr>
+        <a:xfrm>
+          <a:off x="0" y="0"/>
+          <a:ext cx="0" cy="0"/>
+          <a:chOff x="0" y="0"/>
+          <a:chExt cx="0" cy="0"/>
+        </a:xfrm>
+      </p:grpSpPr>
+      <p:sp>
+        <p:nvSpPr>
+          <p:cNvPr id="2" name="Slide Image Placeholder 1"/>
+          <p:cNvSpPr>
+            <a:spLocks noGrp="1" noRot="1" noChangeAspect="1"/>
+          </p:cNvSpPr>
+          <p:nvPr>
+            <p:ph type="sldImg"/>
+          </p:nvPr>
+        </p:nvSpPr>
+        <p:spPr/>
+      </p:sp>
+      <p:sp>
+        <p:nvSpPr>
+          <p:cNvPr id="3" name="Notes Placeholder 2"/>
+          <p:cNvSpPr>
+            <a:spLocks noGrp="1"/>
+          </p:cNvSpPr>
+          <p:nvPr>
+            <p:ph type="body" idx="1"/>
+          </p:nvPr>
+        </p:nvSpPr>
+        <p:spPr/>
+        <p:txBody>
+          <a:bodyPr/>
+          <a:lstStyle/>
+          <a:p>
+            <a:pPr lvl="0" indent="0" marL="0">
+              <a:buNone/>
+            </a:pPr>
+            <a:r>
+              <a:rPr/>
+              <a:t>이 슬라이드는 발표 시작용 표지입니다. 간단한 인사와 발표 목적(데이터 탐색 및 시각화 결과 공유)을 말하면 좋습니다. 발표 시간과 청중 수준을 고려해 핵심 메시지를 미리 안내하세요.</a:t>
+            </a:r>
+          </a:p>
+        </p:txBody>
+      </p:sp>
+      <p:sp>
+        <p:nvSpPr>
+          <p:cNvPr id="4" name="Slide Number Placeholder 3"/>
+          <p:cNvSpPr>
+            <a:spLocks noGrp="1"/>
+          </p:cNvSpPr>
+          <p:nvPr>
+            <p:ph type="sldNum" sz="quarter" idx="10"/>
+          </p:nvPr>
+        </p:nvSpPr>
+        <p:spPr/>
+        <p:txBody>
+          <a:bodyPr/>
+          <a:lstStyle/>
+          <a:p>
+            <a:fld id="{18BDFEC3-8487-43E8-A154-7C12CBC1FFF2}" type="slidenum">
+              <a:rPr lang="en-US"/>
+              <a:t>26</a:t>
+            </a:fld>
+            <a:endParaRPr lang="en-US"/>
+          </a:p>
+        </p:txBody>
+      </p:sp>
+    </p:spTree>
+  </p:cSld>
+</p:notes>
+</file>
+
+<file path=ppt/notesSlides/notesSlide23.xml><?xml version="1.0" encoding="utf-8"?>
+<p:notes xmlns:a="http://schemas.openxmlformats.org/drawingml/2006/main" xmlns:r="http://schemas.openxmlformats.org/officeDocument/2006/relationships" xmlns:p="http://schemas.openxmlformats.org/presentationml/2006/main">
+  <p:cSld>
+    <p:spTree>
+      <p:nvGrpSpPr>
+        <p:cNvPr id="1" name=""/>
+        <p:cNvGrpSpPr/>
+        <p:nvPr/>
+      </p:nvGrpSpPr>
+      <p:grpSpPr>
+        <a:xfrm>
+          <a:off x="0" y="0"/>
+          <a:ext cx="0" cy="0"/>
+          <a:chOff x="0" y="0"/>
+          <a:chExt cx="0" cy="0"/>
+        </a:xfrm>
+      </p:grpSpPr>
+      <p:sp>
+        <p:nvSpPr>
+          <p:cNvPr id="2" name="Slide Image Placeholder 1"/>
+          <p:cNvSpPr>
+            <a:spLocks noGrp="1" noRot="1" noChangeAspect="1"/>
+          </p:cNvSpPr>
+          <p:nvPr>
+            <p:ph type="sldImg"/>
+          </p:nvPr>
+        </p:nvSpPr>
+        <p:spPr/>
+      </p:sp>
+      <p:sp>
+        <p:nvSpPr>
+          <p:cNvPr id="3" name="Notes Placeholder 2"/>
+          <p:cNvSpPr>
+            <a:spLocks noGrp="1"/>
+          </p:cNvSpPr>
+          <p:nvPr>
+            <p:ph type="body" idx="1"/>
+          </p:nvPr>
+        </p:nvSpPr>
+        <p:spPr/>
+        <p:txBody>
+          <a:bodyPr/>
+          <a:lstStyle/>
+          <a:p>
+            <a:pPr lvl="0" indent="0" marL="0">
+              <a:buNone/>
+            </a:pPr>
+            <a:r>
+              <a:rPr/>
+              <a:t>청중에게 발표의 흐름을 미리 안내합니다. 각 섹션별로 1문장씩 설명(데이터, 시각화, 인사이트, 권장사항)을 추가하면 이해가 쉬워집니다.</a:t>
+            </a:r>
+          </a:p>
+        </p:txBody>
+      </p:sp>
+      <p:sp>
+        <p:nvSpPr>
+          <p:cNvPr id="4" name="Slide Number Placeholder 3"/>
+          <p:cNvSpPr>
+            <a:spLocks noGrp="1"/>
+          </p:cNvSpPr>
+          <p:nvPr>
+            <p:ph type="sldNum" sz="quarter" idx="10"/>
+          </p:nvPr>
+        </p:nvSpPr>
+        <p:spPr/>
+        <p:txBody>
+          <a:bodyPr/>
+          <a:lstStyle/>
+          <a:p>
+            <a:fld id="{18BDFEC3-8487-43E8-A154-7C12CBC1FFF2}" type="slidenum">
+              <a:rPr lang="en-US"/>
+              <a:t>27</a:t>
+            </a:fld>
+            <a:endParaRPr lang="en-US"/>
+          </a:p>
+        </p:txBody>
+      </p:sp>
+    </p:spTree>
+  </p:cSld>
+</p:notes>
+</file>
+
+<file path=ppt/notesSlides/notesSlide3.xml><?xml version="1.0" encoding="utf-8"?>
+<p:notes xmlns:a="http://schemas.openxmlformats.org/drawingml/2006/main" xmlns:r="http://schemas.openxmlformats.org/officeDocument/2006/relationships" xmlns:p="http://schemas.openxmlformats.org/presentationml/2006/main">
+  <p:cSld>
+    <p:spTree>
+      <p:nvGrpSpPr>
+        <p:cNvPr id="1" name=""/>
+        <p:cNvGrpSpPr/>
+        <p:nvPr/>
+      </p:nvGrpSpPr>
+      <p:grpSpPr>
+        <a:xfrm>
+          <a:off x="0" y="0"/>
+          <a:ext cx="0" cy="0"/>
+          <a:chOff x="0" y="0"/>
+          <a:chExt cx="0" cy="0"/>
+        </a:xfrm>
+      </p:grpSpPr>
+      <p:sp>
+        <p:nvSpPr>
+          <p:cNvPr id="2" name="Slide Image Placeholder 1"/>
+          <p:cNvSpPr>
+            <a:spLocks noGrp="1" noRot="1" noChangeAspect="1"/>
+          </p:cNvSpPr>
+          <p:nvPr>
+            <p:ph type="sldImg"/>
+          </p:nvPr>
+        </p:nvSpPr>
+        <p:spPr/>
+      </p:sp>
+      <p:sp>
+        <p:nvSpPr>
+          <p:cNvPr id="3" name="Notes Placeholder 2"/>
+          <p:cNvSpPr>
+            <a:spLocks noGrp="1"/>
+          </p:cNvSpPr>
+          <p:nvPr>
+            <p:ph type="body" idx="1"/>
+          </p:nvPr>
+        </p:nvSpPr>
+        <p:spPr/>
+        <p:txBody>
+          <a:bodyPr/>
+          <a:lstStyle/>
+          <a:p>
+            <a:pPr lvl="0" indent="0" marL="0">
+              <a:buNone/>
+            </a:pPr>
+            <a:r>
+              <a:rPr/>
+              <a:t>데이터의 크기와 변수 목록을 간단히 소개합니다. 분석 대상과 범위를 명확히 하여 이후 시각화 해석에서 혼동이 없도록 합니다.</a:t>
+            </a:r>
+          </a:p>
+        </p:txBody>
+      </p:sp>
+      <p:sp>
+        <p:nvSpPr>
+          <p:cNvPr id="4" name="Slide Number Placeholder 3"/>
+          <p:cNvSpPr>
+            <a:spLocks noGrp="1"/>
+          </p:cNvSpPr>
+          <p:nvPr>
+            <p:ph type="sldNum" sz="quarter" idx="10"/>
+          </p:nvPr>
+        </p:nvSpPr>
+        <p:spPr/>
+        <p:txBody>
+          <a:bodyPr/>
+          <a:lstStyle/>
+          <a:p>
+            <a:fld id="{18BDFEC3-8487-43E8-A154-7C12CBC1FFF2}" type="slidenum">
+              <a:rPr lang="en-US"/>
+              <a:t>4</a:t>
+            </a:fld>
+            <a:endParaRPr lang="en-US"/>
+          </a:p>
+        </p:txBody>
+      </p:sp>
+    </p:spTree>
+  </p:cSld>
+</p:notes>
+</file>
+
+<file path=ppt/notesSlides/notesSlide4.xml><?xml version="1.0" encoding="utf-8"?>
+<p:notes xmlns:a="http://schemas.openxmlformats.org/drawingml/2006/main" xmlns:r="http://schemas.openxmlformats.org/officeDocument/2006/relationships" xmlns:p="http://schemas.openxmlformats.org/presentationml/2006/main">
+  <p:cSld>
+    <p:spTree>
+      <p:nvGrpSpPr>
+        <p:cNvPr id="1" name=""/>
+        <p:cNvGrpSpPr/>
+        <p:nvPr/>
+      </p:nvGrpSpPr>
+      <p:grpSpPr>
+        <a:xfrm>
+          <a:off x="0" y="0"/>
+          <a:ext cx="0" cy="0"/>
+          <a:chOff x="0" y="0"/>
+          <a:chExt cx="0" cy="0"/>
+        </a:xfrm>
+      </p:grpSpPr>
+      <p:sp>
+        <p:nvSpPr>
+          <p:cNvPr id="2" name="Slide Image Placeholder 1"/>
+          <p:cNvSpPr>
+            <a:spLocks noGrp="1" noRot="1" noChangeAspect="1"/>
+          </p:cNvSpPr>
+          <p:nvPr>
+            <p:ph type="sldImg"/>
+          </p:nvPr>
+        </p:nvSpPr>
+        <p:spPr/>
+      </p:sp>
+      <p:sp>
+        <p:nvSpPr>
+          <p:cNvPr id="3" name="Notes Placeholder 2"/>
+          <p:cNvSpPr>
+            <a:spLocks noGrp="1"/>
+          </p:cNvSpPr>
+          <p:nvPr>
+            <p:ph type="body" idx="1"/>
+          </p:nvPr>
+        </p:nvSpPr>
+        <p:spPr/>
+        <p:txBody>
+          <a:bodyPr/>
+          <a:lstStyle/>
+          <a:p>
+            <a:pPr lvl="0" indent="0" marL="0">
+              <a:buNone/>
+            </a:pPr>
+            <a:r>
+              <a:rPr/>
+              <a:t>데이터 전처리(결측치 제거) 방식을 알려줍니다. 결측의 분포나 특정 변수에서 결측이 집중되었는지 여부가 해석에 영향을 줄 수 있음을 간단히 언급하세요.</a:t>
+            </a:r>
+          </a:p>
+        </p:txBody>
+      </p:sp>
+      <p:sp>
+        <p:nvSpPr>
+          <p:cNvPr id="4" name="Slide Number Placeholder 3"/>
+          <p:cNvSpPr>
+            <a:spLocks noGrp="1"/>
+          </p:cNvSpPr>
+          <p:nvPr>
+            <p:ph type="sldNum" sz="quarter" idx="10"/>
+          </p:nvPr>
+        </p:nvSpPr>
+        <p:spPr/>
+        <p:txBody>
+          <a:bodyPr/>
+          <a:lstStyle/>
+          <a:p>
+            <a:fld id="{18BDFEC3-8487-43E8-A154-7C12CBC1FFF2}" type="slidenum">
+              <a:rPr lang="en-US"/>
+              <a:t>5</a:t>
+            </a:fld>
+            <a:endParaRPr lang="en-US"/>
+          </a:p>
+        </p:txBody>
+      </p:sp>
+    </p:spTree>
+  </p:cSld>
+</p:notes>
+</file>
+
+<file path=ppt/notesSlides/notesSlide5.xml><?xml version="1.0" encoding="utf-8"?>
+<p:notes xmlns:a="http://schemas.openxmlformats.org/drawingml/2006/main" xmlns:r="http://schemas.openxmlformats.org/officeDocument/2006/relationships" xmlns:p="http://schemas.openxmlformats.org/presentationml/2006/main">
+  <p:cSld>
+    <p:spTree>
+      <p:nvGrpSpPr>
+        <p:cNvPr id="1" name=""/>
+        <p:cNvGrpSpPr/>
+        <p:nvPr/>
+      </p:nvGrpSpPr>
+      <p:grpSpPr>
+        <a:xfrm>
+          <a:off x="0" y="0"/>
+          <a:ext cx="0" cy="0"/>
+          <a:chOff x="0" y="0"/>
+          <a:chExt cx="0" cy="0"/>
+        </a:xfrm>
+      </p:grpSpPr>
+      <p:sp>
+        <p:nvSpPr>
+          <p:cNvPr id="2" name="Slide Image Placeholder 1"/>
+          <p:cNvSpPr>
+            <a:spLocks noGrp="1" noRot="1" noChangeAspect="1"/>
+          </p:cNvSpPr>
+          <p:nvPr>
+            <p:ph type="sldImg"/>
+          </p:nvPr>
+        </p:nvSpPr>
+        <p:spPr/>
+      </p:sp>
+      <p:sp>
+        <p:nvSpPr>
+          <p:cNvPr id="3" name="Notes Placeholder 2"/>
+          <p:cNvSpPr>
+            <a:spLocks noGrp="1"/>
+          </p:cNvSpPr>
+          <p:nvPr>
+            <p:ph type="body" idx="1"/>
+          </p:nvPr>
+        </p:nvSpPr>
+        <p:spPr/>
+        <p:txBody>
+          <a:bodyPr/>
+          <a:lstStyle/>
+          <a:p>
+            <a:pPr lvl="0" indent="0" marL="0">
+              <a:buNone/>
+            </a:pPr>
+            <a:r>
+              <a:rPr/>
+              <a:t>사용한 기법과 목적을 소개합니다. 각 시각화가 어떤 분석 질문(분포, 분류, 상관 등)에 답하는지 한 문장으로 요약해 주세요.</a:t>
+            </a:r>
+          </a:p>
+        </p:txBody>
+      </p:sp>
+      <p:sp>
+        <p:nvSpPr>
+          <p:cNvPr id="4" name="Slide Number Placeholder 3"/>
+          <p:cNvSpPr>
+            <a:spLocks noGrp="1"/>
+          </p:cNvSpPr>
+          <p:nvPr>
+            <p:ph type="sldNum" sz="quarter" idx="10"/>
+          </p:nvPr>
+        </p:nvSpPr>
+        <p:spPr/>
+        <p:txBody>
+          <a:bodyPr/>
+          <a:lstStyle/>
+          <a:p>
+            <a:fld id="{18BDFEC3-8487-43E8-A154-7C12CBC1FFF2}" type="slidenum">
+              <a:rPr lang="en-US"/>
+              <a:t>6</a:t>
+            </a:fld>
+            <a:endParaRPr lang="en-US"/>
+          </a:p>
+        </p:txBody>
+      </p:sp>
+    </p:spTree>
+  </p:cSld>
+</p:notes>
+</file>
+
+<file path=ppt/notesSlides/notesSlide6.xml><?xml version="1.0" encoding="utf-8"?>
+<p:notes xmlns:a="http://schemas.openxmlformats.org/drawingml/2006/main" xmlns:r="http://schemas.openxmlformats.org/officeDocument/2006/relationships" xmlns:p="http://schemas.openxmlformats.org/presentationml/2006/main">
+  <p:cSld>
+    <p:spTree>
+      <p:nvGrpSpPr>
+        <p:cNvPr id="1" name=""/>
+        <p:cNvGrpSpPr/>
+        <p:nvPr/>
+      </p:nvGrpSpPr>
+      <p:grpSpPr>
+        <a:xfrm>
+          <a:off x="0" y="0"/>
+          <a:ext cx="0" cy="0"/>
+          <a:chOff x="0" y="0"/>
+          <a:chExt cx="0" cy="0"/>
+        </a:xfrm>
+      </p:grpSpPr>
+      <p:sp>
+        <p:nvSpPr>
+          <p:cNvPr id="2" name="Slide Image Placeholder 1"/>
+          <p:cNvSpPr>
+            <a:spLocks noGrp="1" noRot="1" noChangeAspect="1"/>
+          </p:cNvSpPr>
+          <p:nvPr>
+            <p:ph type="sldImg"/>
+          </p:nvPr>
+        </p:nvSpPr>
+        <p:spPr/>
+      </p:sp>
+      <p:sp>
+        <p:nvSpPr>
+          <p:cNvPr id="3" name="Notes Placeholder 2"/>
+          <p:cNvSpPr>
+            <a:spLocks noGrp="1"/>
+          </p:cNvSpPr>
+          <p:nvPr>
+            <p:ph type="body" idx="1"/>
+          </p:nvPr>
+        </p:nvSpPr>
+        <p:spPr/>
+        <p:txBody>
+          <a:bodyPr/>
+          <a:lstStyle/>
+          <a:p>
+            <a:pPr lvl="0" indent="0" marL="0">
+              <a:buNone/>
+            </a:pPr>
+            <a:r>
+              <a:rPr/>
+              <a:t>교차표로 종과 섬의 결합 분포를 보여줍니다. 특정 종이 특정 섬에만 관측되는 패턴은 서식지 선호 또는 표본 수집 편향을 시사하므로 보전·표본설계 관점에서 중요합니다.</a:t>
+            </a:r>
+          </a:p>
+        </p:txBody>
+      </p:sp>
+      <p:sp>
+        <p:nvSpPr>
+          <p:cNvPr id="4" name="Slide Number Placeholder 3"/>
+          <p:cNvSpPr>
+            <a:spLocks noGrp="1"/>
+          </p:cNvSpPr>
+          <p:nvPr>
+            <p:ph type="sldNum" sz="quarter" idx="10"/>
+          </p:nvPr>
+        </p:nvSpPr>
+        <p:spPr/>
+        <p:txBody>
+          <a:bodyPr/>
+          <a:lstStyle/>
+          <a:p>
+            <a:fld id="{18BDFEC3-8487-43E8-A154-7C12CBC1FFF2}" type="slidenum">
+              <a:rPr lang="en-US"/>
+              <a:t>8</a:t>
+            </a:fld>
+            <a:endParaRPr lang="en-US"/>
+          </a:p>
+        </p:txBody>
+      </p:sp>
+    </p:spTree>
+  </p:cSld>
+</p:notes>
+</file>
+
+<file path=ppt/notesSlides/notesSlide7.xml><?xml version="1.0" encoding="utf-8"?>
+<p:notes xmlns:a="http://schemas.openxmlformats.org/drawingml/2006/main" xmlns:r="http://schemas.openxmlformats.org/officeDocument/2006/relationships" xmlns:p="http://schemas.openxmlformats.org/presentationml/2006/main">
+  <p:cSld>
+    <p:spTree>
+      <p:nvGrpSpPr>
+        <p:cNvPr id="1" name=""/>
+        <p:cNvGrpSpPr/>
+        <p:nvPr/>
+      </p:nvGrpSpPr>
+      <p:grpSpPr>
+        <a:xfrm>
+          <a:off x="0" y="0"/>
+          <a:ext cx="0" cy="0"/>
+          <a:chOff x="0" y="0"/>
+          <a:chExt cx="0" cy="0"/>
+        </a:xfrm>
+      </p:grpSpPr>
+      <p:sp>
+        <p:nvSpPr>
+          <p:cNvPr id="2" name="Slide Image Placeholder 1"/>
+          <p:cNvSpPr>
+            <a:spLocks noGrp="1" noRot="1" noChangeAspect="1"/>
+          </p:cNvSpPr>
+          <p:nvPr>
+            <p:ph type="sldImg"/>
+          </p:nvPr>
+        </p:nvSpPr>
+        <p:spPr/>
+      </p:sp>
+      <p:sp>
+        <p:nvSpPr>
+          <p:cNvPr id="3" name="Notes Placeholder 2"/>
+          <p:cNvSpPr>
+            <a:spLocks noGrp="1"/>
+          </p:cNvSpPr>
+          <p:nvPr>
+            <p:ph type="body" idx="1"/>
+          </p:nvPr>
+        </p:nvSpPr>
+        <p:spPr/>
+        <p:txBody>
+          <a:bodyPr/>
+          <a:lstStyle/>
+          <a:p>
+            <a:pPr lvl="0" indent="0" marL="0">
+              <a:buNone/>
+            </a:pPr>
+            <a:r>
+              <a:rPr/>
+              <a:t>피봇테이블은 섬별로 종의 평균 체중을 비교합니다. nan은 표본 부족을 의미하므로 통계검정 전 표본 수 확인이 필요합니다.</a:t>
+            </a:r>
+          </a:p>
+        </p:txBody>
+      </p:sp>
+      <p:sp>
+        <p:nvSpPr>
+          <p:cNvPr id="4" name="Slide Number Placeholder 3"/>
+          <p:cNvSpPr>
+            <a:spLocks noGrp="1"/>
+          </p:cNvSpPr>
+          <p:nvPr>
+            <p:ph type="sldNum" sz="quarter" idx="10"/>
+          </p:nvPr>
+        </p:nvSpPr>
+        <p:spPr/>
+        <p:txBody>
+          <a:bodyPr/>
+          <a:lstStyle/>
+          <a:p>
+            <a:fld id="{18BDFEC3-8487-43E8-A154-7C12CBC1FFF2}" type="slidenum">
+              <a:rPr lang="en-US"/>
+              <a:t>10</a:t>
+            </a:fld>
+            <a:endParaRPr lang="en-US"/>
+          </a:p>
+        </p:txBody>
+      </p:sp>
+    </p:spTree>
+  </p:cSld>
+</p:notes>
+</file>
+
+<file path=ppt/notesSlides/notesSlide8.xml><?xml version="1.0" encoding="utf-8"?>
+<p:notes xmlns:a="http://schemas.openxmlformats.org/drawingml/2006/main" xmlns:r="http://schemas.openxmlformats.org/officeDocument/2006/relationships" xmlns:p="http://schemas.openxmlformats.org/presentationml/2006/main">
+  <p:cSld>
+    <p:spTree>
+      <p:nvGrpSpPr>
+        <p:cNvPr id="1" name=""/>
+        <p:cNvGrpSpPr/>
+        <p:nvPr/>
+      </p:nvGrpSpPr>
+      <p:grpSpPr>
+        <a:xfrm>
+          <a:off x="0" y="0"/>
+          <a:ext cx="0" cy="0"/>
+          <a:chOff x="0" y="0"/>
+          <a:chExt cx="0" cy="0"/>
+        </a:xfrm>
+      </p:grpSpPr>
+      <p:sp>
+        <p:nvSpPr>
+          <p:cNvPr id="2" name="Slide Image Placeholder 1"/>
+          <p:cNvSpPr>
+            <a:spLocks noGrp="1" noRot="1" noChangeAspect="1"/>
+          </p:cNvSpPr>
+          <p:nvPr>
+            <p:ph type="sldImg"/>
+          </p:nvPr>
+        </p:nvSpPr>
+        <p:spPr/>
+      </p:sp>
+      <p:sp>
+        <p:nvSpPr>
+          <p:cNvPr id="3" name="Notes Placeholder 2"/>
+          <p:cNvSpPr>
+            <a:spLocks noGrp="1"/>
+          </p:cNvSpPr>
+          <p:nvPr>
+            <p:ph type="body" idx="1"/>
+          </p:nvPr>
+        </p:nvSpPr>
+        <p:spPr/>
+        <p:txBody>
+          <a:bodyPr/>
+          <a:lstStyle/>
+          <a:p>
+            <a:pPr lvl="0" indent="0" marL="0">
+              <a:buNone/>
+            </a:pPr>
+            <a:r>
+              <a:rPr/>
+              <a:t>히스토그램을 통해 중심경향(평균·중앙값)과 분포의 비대칭성을 설명하세요. 이상치로 보이는 고체중 관측값은 측정 오류 또는 특이 개체일 수 있음을 언급합니다.</a:t>
+            </a:r>
+          </a:p>
+        </p:txBody>
+      </p:sp>
+      <p:sp>
+        <p:nvSpPr>
+          <p:cNvPr id="4" name="Slide Number Placeholder 3"/>
+          <p:cNvSpPr>
+            <a:spLocks noGrp="1"/>
+          </p:cNvSpPr>
+          <p:nvPr>
+            <p:ph type="sldNum" sz="quarter" idx="10"/>
+          </p:nvPr>
+        </p:nvSpPr>
+        <p:spPr/>
+        <p:txBody>
+          <a:bodyPr/>
+          <a:lstStyle/>
+          <a:p>
+            <a:fld id="{18BDFEC3-8487-43E8-A154-7C12CBC1FFF2}" type="slidenum">
+              <a:rPr lang="en-US"/>
+              <a:t>11</a:t>
+            </a:fld>
+            <a:endParaRPr lang="en-US"/>
+          </a:p>
+        </p:txBody>
+      </p:sp>
+    </p:spTree>
+  </p:cSld>
+</p:notes>
+</file>
+
+<file path=ppt/notesSlides/notesSlide9.xml><?xml version="1.0" encoding="utf-8"?>
+<p:notes xmlns:a="http://schemas.openxmlformats.org/drawingml/2006/main" xmlns:r="http://schemas.openxmlformats.org/officeDocument/2006/relationships" xmlns:p="http://schemas.openxmlformats.org/presentationml/2006/main">
+  <p:cSld>
+    <p:spTree>
+      <p:nvGrpSpPr>
+        <p:cNvPr id="1" name=""/>
+        <p:cNvGrpSpPr/>
+        <p:nvPr/>
+      </p:nvGrpSpPr>
+      <p:grpSpPr>
+        <a:xfrm>
+          <a:off x="0" y="0"/>
+          <a:ext cx="0" cy="0"/>
+          <a:chOff x="0" y="0"/>
+          <a:chExt cx="0" cy="0"/>
+        </a:xfrm>
+      </p:grpSpPr>
+      <p:sp>
+        <p:nvSpPr>
+          <p:cNvPr id="2" name="Slide Image Placeholder 1"/>
+          <p:cNvSpPr>
+            <a:spLocks noGrp="1" noRot="1" noChangeAspect="1"/>
+          </p:cNvSpPr>
+          <p:nvPr>
+            <p:ph type="sldImg"/>
+          </p:nvPr>
+        </p:nvSpPr>
+        <p:spPr/>
+      </p:sp>
+      <p:sp>
+        <p:nvSpPr>
+          <p:cNvPr id="3" name="Notes Placeholder 2"/>
+          <p:cNvSpPr>
+            <a:spLocks noGrp="1"/>
+          </p:cNvSpPr>
+          <p:nvPr>
+            <p:ph type="body" idx="1"/>
+          </p:nvPr>
+        </p:nvSpPr>
+        <p:spPr/>
+        <p:txBody>
+          <a:bodyPr/>
+          <a:lstStyle/>
+          <a:p>
+            <a:pPr lvl="0" indent="0" marL="0">
+              <a:buNone/>
+            </a:pPr>
+            <a:r>
+              <a:rPr/>
+              <a:t>KDE는 분포의 형태를 부드럽게 보여줍니다. 종별 피크 위치와 폭의 차이를 설명하고, 지느러미 길이가 분류에 유용한 변수임을 강조하세요.</a:t>
+            </a:r>
+          </a:p>
+        </p:txBody>
+      </p:sp>
+      <p:sp>
+        <p:nvSpPr>
+          <p:cNvPr id="4" name="Slide Number Placeholder 3"/>
+          <p:cNvSpPr>
+            <a:spLocks noGrp="1"/>
+          </p:cNvSpPr>
+          <p:nvPr>
+            <p:ph type="sldNum" sz="quarter" idx="10"/>
+          </p:nvPr>
+        </p:nvSpPr>
+        <p:spPr/>
+        <p:txBody>
+          <a:bodyPr/>
+          <a:lstStyle/>
+          <a:p>
+            <a:fld id="{18BDFEC3-8487-43E8-A154-7C12CBC1FFF2}" type="slidenum">
+              <a:rPr lang="en-US"/>
+              <a:t>12</a:t>
+            </a:fld>
+            <a:endParaRPr lang="en-US"/>
+          </a:p>
+        </p:txBody>
+      </p:sp>
+    </p:spTree>
+  </p:cSld>
+</p:notes>
 </file>
 
 <file path=ppt/slideLayouts/slideLayout1.xml><?xml version="1.0" encoding="utf-8"?>
@@ -3185,7 +5436,7 @@
             </a:pPr>
             <a:r>
               <a:rPr/>
-              <a:t>설명: 섬별로 동일 종의 평균 체중 차이가 존재할 수 있으며, 추가 통계 검정으로 확인 권장.</a:t>
+              <a:t>설명: 일부 조합에서 데이터 부족으로 평균 계산이 불가합니다.</a:t>
             </a:r>
           </a:p>
         </p:txBody>
@@ -3232,7 +5483,7 @@
             </a:pPr>
             <a:r>
               <a:rPr/>
-              <a:t>히스토그램: 체중 분포</a:t>
+              <a:t>8. 히스토그램: 체중 분포</a:t>
             </a:r>
           </a:p>
         </p:txBody>
@@ -3246,7 +5497,7 @@
           <p:nvPr/>
         </p:nvPicPr>
         <p:blipFill>
-          <a:blip r:embed="rId2"/>
+          <a:blip r:embed="rId3"/>
           <a:stretch>
             <a:fillRect/>
           </a:stretch>
@@ -3317,7 +5568,7 @@
             </a:pPr>
             <a:r>
               <a:rPr/>
-              <a:t>설명: 체중은 약간 우측편향이며 Gentoo가 상대적으로 더 무겁습니다.</a:t>
+              <a:t>설명: 전체 체중 분포는 우측으로 약간 치우쳐 있으며, Gentoo가 비교적 무거운 경향을 보입니다.</a:t>
             </a:r>
           </a:p>
         </p:txBody>
@@ -3364,7 +5615,7 @@
             </a:pPr>
             <a:r>
               <a:rPr/>
-              <a:t>KDE: 지느러미 길이 (종별)</a:t>
+              <a:t>9. KDE: 지느러미 길이 (종별)</a:t>
             </a:r>
           </a:p>
         </p:txBody>
@@ -3378,7 +5629,7 @@
           <p:nvPr/>
         </p:nvPicPr>
         <p:blipFill>
-          <a:blip r:embed="rId2"/>
+          <a:blip r:embed="rId3"/>
           <a:stretch>
             <a:fillRect/>
           </a:stretch>
@@ -3449,7 +5700,7 @@
             </a:pPr>
             <a:r>
               <a:rPr/>
-              <a:t>설명: Gentoo가 평균 지느러미 길이가 길며 종별 분포 차이가 뚜렷합니다.</a:t>
+              <a:t>설명: Gentoo가 지느러미 길이에서 가장 큰 값을 가지며, 종별 분포 차이가 뚜렷합니다.</a:t>
             </a:r>
           </a:p>
         </p:txBody>
@@ -3496,7 +5747,7 @@
             </a:pPr>
             <a:r>
               <a:rPr/>
-              <a:t>산점도: 지느러미 길이 vs 체중</a:t>
+              <a:t>10. 산점도: 지느러미 길이 vs 체중</a:t>
             </a:r>
           </a:p>
         </p:txBody>
@@ -3510,7 +5761,7 @@
           <p:nvPr/>
         </p:nvPicPr>
         <p:blipFill>
-          <a:blip r:embed="rId2"/>
+          <a:blip r:embed="rId3"/>
           <a:stretch>
             <a:fillRect/>
           </a:stretch>
@@ -3581,7 +5832,7 @@
             </a:pPr>
             <a:r>
               <a:rPr/>
-              <a:t>설명: 양의 상관관계가 관찰되며 종별 군집이 존재합니다.</a:t>
+              <a:t>설명: 지느러미 길이와 체중 사이에 양의 상관 경향이 관찰됩니다.</a:t>
             </a:r>
           </a:p>
         </p:txBody>
@@ -3628,7 +5879,7 @@
             </a:pPr>
             <a:r>
               <a:rPr/>
-              <a:t>페어플롯</a:t>
+              <a:t>11. 페어플롯</a:t>
             </a:r>
           </a:p>
         </p:txBody>
@@ -3642,7 +5893,7 @@
           <p:nvPr/>
         </p:nvPicPr>
         <p:blipFill>
-          <a:blip r:embed="rId2"/>
+          <a:blip r:embed="rId3"/>
           <a:stretch>
             <a:fillRect/>
           </a:stretch>
@@ -3713,7 +5964,7 @@
             </a:pPr>
             <a:r>
               <a:rPr/>
-              <a:t>설명: 변수쌍마다 종 분리력 차이가 있으며, 분류모형 변수 선택 시 참고됩니다.</a:t>
+              <a:t>설명: 변수 조합별로 종 분리도가 다르게 나타납니다.</a:t>
             </a:r>
           </a:p>
         </p:txBody>
@@ -3760,7 +6011,7 @@
             </a:pPr>
             <a:r>
               <a:rPr/>
-              <a:t>박스플롯: 종별 체중</a:t>
+              <a:t>12. 박스플롯: 종별 체중</a:t>
             </a:r>
           </a:p>
         </p:txBody>
@@ -3774,7 +6025,7 @@
           <p:nvPr/>
         </p:nvPicPr>
         <p:blipFill>
-          <a:blip r:embed="rId2"/>
+          <a:blip r:embed="rId3"/>
           <a:stretch>
             <a:fillRect/>
           </a:stretch>
@@ -3845,7 +6096,7 @@
             </a:pPr>
             <a:r>
               <a:rPr/>
-              <a:t>설명: Gentoo는 중앙값이 높고 변동성도 큽니다.</a:t>
+              <a:t>설명: Gentoo는 중앙값과 IQR이 큰 편입니다.</a:t>
             </a:r>
           </a:p>
         </p:txBody>
@@ -3892,7 +6143,7 @@
             </a:pPr>
             <a:r>
               <a:rPr/>
-              <a:t>바이올린: 지느러미 길이(종별)</a:t>
+              <a:t>13. 바이올린 플롯: 지느러미 길이(종별)</a:t>
             </a:r>
           </a:p>
         </p:txBody>
@@ -3906,7 +6157,7 @@
           <p:nvPr/>
         </p:nvPicPr>
         <p:blipFill>
-          <a:blip r:embed="rId2"/>
+          <a:blip r:embed="rId3"/>
           <a:stretch>
             <a:fillRect/>
           </a:stretch>
@@ -3977,7 +6228,7 @@
             </a:pPr>
             <a:r>
               <a:rPr/>
-              <a:t>설명: 분포 형태와 내부 구조(다중 모드 등)를 보여줍니다.</a:t>
+              <a:t>설명: 분포의 밀도와 다중 피크 여부를 시각적으로 파악할 수 있습니다.</a:t>
             </a:r>
           </a:p>
         </p:txBody>
@@ -4024,7 +6275,7 @@
             </a:pPr>
             <a:r>
               <a:rPr/>
-              <a:t>종별 카운트</a:t>
+              <a:t>14. 종별 카운트</a:t>
             </a:r>
           </a:p>
         </p:txBody>
@@ -4038,7 +6289,7 @@
           <p:nvPr/>
         </p:nvPicPr>
         <p:blipFill>
-          <a:blip r:embed="rId2"/>
+          <a:blip r:embed="rId3"/>
           <a:stretch>
             <a:fillRect/>
           </a:stretch>
@@ -4109,7 +6360,7 @@
             </a:pPr>
             <a:r>
               <a:rPr/>
-              <a:t>설명: Adelie 표본이 가장 많아 표본 편향 가능성이 있습니다.</a:t>
+              <a:t>설명: Adelie 표본이 가장 많아 표본 불균형이 존재합니다.</a:t>
             </a:r>
           </a:p>
         </p:txBody>
@@ -4156,7 +6407,7 @@
             </a:pPr>
             <a:r>
               <a:rPr/>
-              <a:t>섬별 평균 체중(바 차트)</a:t>
+              <a:t>15. 섬별 평균 체중(바 차트)</a:t>
             </a:r>
           </a:p>
         </p:txBody>
@@ -4170,7 +6421,7 @@
           <p:nvPr/>
         </p:nvPicPr>
         <p:blipFill>
-          <a:blip r:embed="rId2"/>
+          <a:blip r:embed="rId3"/>
           <a:stretch>
             <a:fillRect/>
           </a:stretch>
@@ -4241,7 +6492,7 @@
             </a:pPr>
             <a:r>
               <a:rPr/>
-              <a:t>설명: 섬 간 체중 차이는 지역적 생태 요인을 시사합니다.</a:t>
+              <a:t>설명: 섬 간 평균 체중 차이가 관찰됩니다.</a:t>
             </a:r>
           </a:p>
         </p:txBody>
@@ -4288,7 +6539,7 @@
             </a:pPr>
             <a:r>
               <a:rPr/>
-              <a:t>스웜플롯: 부리 길이(종별)</a:t>
+              <a:t>16. 스웜플롯: 부리 길이(종별)</a:t>
             </a:r>
           </a:p>
         </p:txBody>
@@ -4302,7 +6553,7 @@
           <p:nvPr/>
         </p:nvPicPr>
         <p:blipFill>
-          <a:blip r:embed="rId2"/>
+          <a:blip r:embed="rId3"/>
           <a:stretch>
             <a:fillRect/>
           </a:stretch>
@@ -4373,7 +6624,7 @@
             </a:pPr>
             <a:r>
               <a:rPr/>
-              <a:t>설명: 개체 수준 분포를 보여주며 성별/종별 차이를 파악할 수 있습니다.</a:t>
+              <a:t>설명: 개체 수준 분포를 보여주며 밀집 영역과 이상치를 확인할 수 있습니다.</a:t>
             </a:r>
           </a:p>
         </p:txBody>
@@ -4420,7 +6671,7 @@
             </a:pPr>
             <a:r>
               <a:rPr/>
-              <a:t>제목</a:t>
+              <a:t>1. 제목</a:t>
             </a:r>
           </a:p>
         </p:txBody>
@@ -4454,7 +6705,7 @@
             </a:pPr>
             <a:r>
               <a:rPr/>
-              <a:t>저자: 분석 스크립트 자동 생성</a:t>
+              <a:t>저자: 자동 생성 분석 스크립트</a:t>
             </a:r>
           </a:p>
         </p:txBody>
@@ -4501,7 +6752,7 @@
             </a:pPr>
             <a:r>
               <a:rPr/>
-              <a:t>종별 체중 KDE</a:t>
+              <a:t>17. 종별 체중 KDE</a:t>
             </a:r>
           </a:p>
         </p:txBody>
@@ -4515,7 +6766,7 @@
           <p:nvPr/>
         </p:nvPicPr>
         <p:blipFill>
-          <a:blip r:embed="rId2"/>
+          <a:blip r:embed="rId3"/>
           <a:stretch>
             <a:fillRect/>
           </a:stretch>
@@ -4586,7 +6837,7 @@
             </a:pPr>
             <a:r>
               <a:rPr/>
-              <a:t>설명: 연속 밀도 비교로 종별 특성 및 중첩 정도를 확인합니다.</a:t>
+              <a:t>설명: 종별 체중 분포의 피크 및 폭 비교를 통해 특성을 파악합니다.</a:t>
             </a:r>
           </a:p>
         </p:txBody>
@@ -4633,7 +6884,7 @@
             </a:pPr>
             <a:r>
               <a:rPr/>
-              <a:t>상관행렬 히트맵</a:t>
+              <a:t>18. 상관행렬 히트맵</a:t>
             </a:r>
           </a:p>
         </p:txBody>
@@ -4647,7 +6898,7 @@
           <p:nvPr/>
         </p:nvPicPr>
         <p:blipFill>
-          <a:blip r:embed="rId2"/>
+          <a:blip r:embed="rId3"/>
           <a:stretch>
             <a:fillRect/>
           </a:stretch>
@@ -4765,7 +7016,7 @@
             </a:pPr>
             <a:r>
               <a:rPr/>
-              <a:t>종별 분할 산점도</a:t>
+              <a:t>19. 종별 분할 산점도</a:t>
             </a:r>
           </a:p>
         </p:txBody>
@@ -4779,7 +7030,7 @@
           <p:nvPr/>
         </p:nvPicPr>
         <p:blipFill>
-          <a:blip r:embed="rId2"/>
+          <a:blip r:embed="rId3"/>
           <a:stretch>
             <a:fillRect/>
           </a:stretch>
@@ -4850,7 +7101,7 @@
             </a:pPr>
             <a:r>
               <a:rPr/>
-              <a:t>설명: 종별 패턴 차이로 변수의 판별력을 확인할 수 있습니다.</a:t>
+              <a:t>설명: 종별로 동일 변수 쌍에서 다른 패턴을 확인할 수 있습니다.</a:t>
             </a:r>
           </a:p>
         </p:txBody>
@@ -4897,7 +7148,7 @@
             </a:pPr>
             <a:r>
               <a:rPr/>
-              <a:t>요약 및 권장사항</a:t>
+              <a:t>20. 요약 및 권장사항</a:t>
             </a:r>
           </a:p>
         </p:txBody>
@@ -4920,14 +7171,14 @@
             <a:pPr lvl="0"/>
             <a:r>
               <a:rPr/>
-              <a:t>주요 발견: 종별 체중 및 지느러미 길이 차이 뚜렷, 섬별 체중 차이 관찰, 표본 수 불균형.</a:t>
+              <a:t>주요 발견: 종별 체중 및 지느러미 길이 차이 뚜렷, 섬별 체중 차이 관찰, 표본 불균형</a:t>
             </a:r>
           </a:p>
           <a:p>
             <a:pPr lvl="0"/>
             <a:r>
               <a:rPr/>
-              <a:t>권장: (1) 섬 간 차이 통계검정, (2) 표본 편향 보정, (3) 분류모델 실험(교차검증).</a:t>
+              <a:t>권장 작업: 통계검정(ANOVA 등), 표본 편향 보정, 분류모델 검증</a:t>
             </a:r>
           </a:p>
         </p:txBody>
@@ -5030,7 +7281,227 @@
             <a:pPr lvl="0"/>
             <a:r>
               <a:rPr/>
-              <a:t>모든 시각화 이미지: output/ 폴더 참조</a:t>
+              <a:t>시각화 이미지: </a:t>
+            </a:r>
+            <a:r>
+              <a:rPr>
+                <a:latin typeface="Courier"/>
+              </a:rPr>
+              <a:t>output/</a:t>
+            </a:r>
+            <a:r>
+              <a:rPr/>
+              <a:t> 폴더 참조</a:t>
+            </a:r>
+          </a:p>
+        </p:txBody>
+      </p:sp>
+    </p:spTree>
+  </p:cSld>
+</p:sld>
+</file>
+
+<file path=ppt/slides/slide25.xml><?xml version="1.0" encoding="utf-8"?>
+<p:sld xmlns:a="http://schemas.openxmlformats.org/drawingml/2006/main" xmlns:r="http://schemas.openxmlformats.org/officeDocument/2006/relationships" xmlns:p="http://schemas.openxmlformats.org/presentationml/2006/main">
+  <p:cSld>
+    <p:spTree>
+      <p:nvGrpSpPr>
+        <p:cNvPr id="1" name=""/>
+        <p:cNvGrpSpPr/>
+        <p:nvPr/>
+      </p:nvGrpSpPr>
+      <p:grpSpPr>
+        <a:xfrm>
+          <a:off x="0" y="0"/>
+          <a:ext cx="0" cy="0"/>
+          <a:chOff x="0" y="0"/>
+          <a:chExt cx="0" cy="0"/>
+        </a:xfrm>
+      </p:grpSpPr>
+      <p:sp>
+        <p:nvSpPr>
+          <p:cNvPr id="2" name="Title 1"/>
+          <p:cNvSpPr>
+            <a:spLocks noGrp="1"/>
+          </p:cNvSpPr>
+          <p:nvPr>
+            <p:ph type="title"/>
+          </p:nvPr>
+        </p:nvSpPr>
+        <p:spPr>
+          <a:xfrm>
+            <a:off x="722313" y="3305176"/>
+            <a:ext cx="7772400" cy="1021556"/>
+          </a:xfrm>
+        </p:spPr>
+        <p:txBody>
+          <a:bodyPr/>
+          <a:lstStyle/>
+          <a:p>
+            <a:pPr lvl="0" indent="0" marL="0">
+              <a:buNone/>
+            </a:pPr>
+            <a:r>
+              <a:rPr/>
+              <a:t>펭귄 데이터 분석 슬라이드</a:t>
+            </a:r>
+          </a:p>
+        </p:txBody>
+      </p:sp>
+    </p:spTree>
+  </p:cSld>
+</p:sld>
+</file>
+
+<file path=ppt/slides/slide26.xml><?xml version="1.0" encoding="utf-8"?>
+<p:sld xmlns:a="http://schemas.openxmlformats.org/drawingml/2006/main" xmlns:r="http://schemas.openxmlformats.org/officeDocument/2006/relationships" xmlns:p="http://schemas.openxmlformats.org/presentationml/2006/main">
+  <p:cSld>
+    <p:spTree>
+      <p:nvGrpSpPr>
+        <p:cNvPr id="1" name=""/>
+        <p:cNvGrpSpPr/>
+        <p:nvPr/>
+      </p:nvGrpSpPr>
+      <p:grpSpPr>
+        <a:xfrm>
+          <a:off x="0" y="0"/>
+          <a:ext cx="0" cy="0"/>
+          <a:chOff x="0" y="0"/>
+          <a:chExt cx="0" cy="0"/>
+        </a:xfrm>
+      </p:grpSpPr>
+      <p:sp>
+        <p:nvSpPr>
+          <p:cNvPr id="2" name="Title 1"/>
+          <p:cNvSpPr>
+            <a:spLocks noGrp="1"/>
+          </p:cNvSpPr>
+          <p:nvPr>
+            <p:ph type="title"/>
+          </p:nvPr>
+        </p:nvSpPr>
+        <p:spPr/>
+        <p:txBody>
+          <a:bodyPr/>
+          <a:lstStyle/>
+          <a:p>
+            <a:pPr lvl="0" indent="0" marL="0">
+              <a:buNone/>
+            </a:pPr>
+            <a:r>
+              <a:rPr/>
+              <a:t>1. 제목</a:t>
+            </a:r>
+          </a:p>
+        </p:txBody>
+      </p:sp>
+      <p:sp>
+        <p:nvSpPr>
+          <p:cNvPr id="3" name="Content Placeholder 2"/>
+          <p:cNvSpPr>
+            <a:spLocks noGrp="1"/>
+          </p:cNvSpPr>
+          <p:nvPr>
+            <p:ph idx="1"/>
+          </p:nvPr>
+        </p:nvSpPr>
+        <p:spPr/>
+        <p:txBody>
+          <a:bodyPr/>
+          <a:lstStyle/>
+          <a:p>
+            <a:pPr lvl="0" indent="0" marL="0">
+              <a:buNone/>
+            </a:pPr>
+            <a:r>
+              <a:rPr/>
+              <a:t>펭귄 데이터셋 분석</a:t>
+            </a:r>
+          </a:p>
+          <a:p>
+            <a:pPr lvl="0" indent="0" marL="0">
+              <a:buNone/>
+            </a:pPr>
+            <a:r>
+              <a:rPr/>
+              <a:t>저자: 자동 생성 분석 스크립트</a:t>
+            </a:r>
+          </a:p>
+        </p:txBody>
+      </p:sp>
+    </p:spTree>
+  </p:cSld>
+</p:sld>
+</file>
+
+<file path=ppt/slides/slide27.xml><?xml version="1.0" encoding="utf-8"?>
+<p:sld xmlns:a="http://schemas.openxmlformats.org/drawingml/2006/main" xmlns:r="http://schemas.openxmlformats.org/officeDocument/2006/relationships" xmlns:p="http://schemas.openxmlformats.org/presentationml/2006/main">
+  <p:cSld>
+    <p:spTree>
+      <p:nvGrpSpPr>
+        <p:cNvPr id="1" name=""/>
+        <p:cNvGrpSpPr/>
+        <p:nvPr/>
+      </p:nvGrpSpPr>
+      <p:grpSpPr>
+        <a:xfrm>
+          <a:off x="0" y="0"/>
+          <a:ext cx="0" cy="0"/>
+          <a:chOff x="0" y="0"/>
+          <a:chExt cx="0" cy="0"/>
+        </a:xfrm>
+      </p:grpSpPr>
+      <p:sp>
+        <p:nvSpPr>
+          <p:cNvPr id="2" name="Title 1"/>
+          <p:cNvSpPr>
+            <a:spLocks noGrp="1"/>
+          </p:cNvSpPr>
+          <p:nvPr>
+            <p:ph type="title"/>
+          </p:nvPr>
+        </p:nvSpPr>
+        <p:spPr/>
+        <p:txBody>
+          <a:bodyPr/>
+          <a:lstStyle/>
+          <a:p>
+            <a:pPr lvl="0" indent="0" marL="0">
+              <a:buNone/>
+            </a:pPr>
+            <a:r>
+              <a:rPr/>
+              <a:t>2. 개요</a:t>
+            </a:r>
+          </a:p>
+        </p:txBody>
+      </p:sp>
+      <p:sp>
+        <p:nvSpPr>
+          <p:cNvPr id="3" name="Content Placeholder 2"/>
+          <p:cNvSpPr>
+            <a:spLocks noGrp="1"/>
+          </p:cNvSpPr>
+          <p:nvPr>
+            <p:ph idx="1"/>
+          </p:nvPr>
+        </p:nvSpPr>
+        <p:spPr/>
+        <p:txBody>
+          <a:bodyPr/>
+          <a:lstStyle/>
+          <a:p>
+            <a:pPr lvl="0"/>
+            <a:r>
+              <a:rPr/>
+              <a:t>목적: 펭귄 특성 분석 및 시각화</a:t>
+            </a:r>
+          </a:p>
+          <a:p>
+            <a:pPr lvl="0"/>
+            <a:r>
+              <a:rPr/>
+              <a:t>포함 항목: 데이터 요약, 교차표·피봇, 주요 시각화(12개 이상), 인사이트</a:t>
             </a:r>
           </a:p>
         </p:txBody>
@@ -5077,7 +7548,7 @@
             </a:pPr>
             <a:r>
               <a:rPr/>
-              <a:t>개요</a:t>
+              <a:t>2. 개요</a:t>
             </a:r>
           </a:p>
         </p:txBody>
@@ -5100,14 +7571,14 @@
             <a:pPr lvl="0"/>
             <a:r>
               <a:rPr/>
-              <a:t>목적: 펭귄 데이터 시각화 및 인사이트 제공</a:t>
+              <a:t>목적: 펭귄 특성 분석 및 시각화</a:t>
             </a:r>
           </a:p>
           <a:p>
             <a:pPr lvl="0"/>
             <a:r>
               <a:rPr/>
-              <a:t>포함: 교차표, 피봇, 12개 이상 시각화 및 분석 인사이트</a:t>
+              <a:t>포함 항목: 데이터 요약, 교차표·피봇, 주요 시각화(12개 이상), 인사이트</a:t>
             </a:r>
           </a:p>
         </p:txBody>
@@ -5154,7 +7625,7 @@
             </a:pPr>
             <a:r>
               <a:rPr/>
-              <a:t>요약 정보</a:t>
+              <a:t>3. 요약 정보</a:t>
             </a:r>
           </a:p>
         </p:txBody>
@@ -5177,7 +7648,14 @@
             <a:pPr lvl="0"/>
             <a:r>
               <a:rPr/>
-              <a:t>결측치 제거 후 관측치 수: 333</a:t>
+              <a:t>관측치(결측치 제거 후): 333</a:t>
+            </a:r>
+          </a:p>
+          <a:p>
+            <a:pPr lvl="0"/>
+            <a:r>
+              <a:rPr/>
+              <a:t>주요 변수: 종(species), 섬(island), 부리 길이/깊이, 지느러미 길이, 체중, 성별</a:t>
             </a:r>
           </a:p>
         </p:txBody>
@@ -5224,7 +7702,7 @@
             </a:pPr>
             <a:r>
               <a:rPr/>
-              <a:t>데이터셋 설명</a:t>
+              <a:t>4. 데이터셋 설명</a:t>
             </a:r>
           </a:p>
         </p:txBody>
@@ -5243,13 +7721,6 @@
         <p:txBody>
           <a:bodyPr/>
           <a:lstStyle/>
-          <a:p>
-            <a:pPr lvl="0"/>
-            <a:r>
-              <a:rPr/>
-              <a:t>변수: species, island, bill_length_mm, bill_depth_mm, flipper_length_mm, body_mass_g, sex</a:t>
-            </a:r>
-          </a:p>
           <a:p>
             <a:pPr lvl="0"/>
             <a:r>
@@ -5265,6 +7736,13 @@
             <a:r>
               <a:rPr/>
               <a:t> 데이터셋</a:t>
+            </a:r>
+          </a:p>
+          <a:p>
+            <a:pPr lvl="0"/>
+            <a:r>
+              <a:rPr/>
+              <a:t>결측값 처리: 결측 행 제거</a:t>
             </a:r>
           </a:p>
         </p:txBody>
@@ -5311,7 +7789,7 @@
             </a:pPr>
             <a:r>
               <a:rPr/>
-              <a:t>분석 방법론</a:t>
+              <a:t>5. 분석 방법론</a:t>
             </a:r>
           </a:p>
         </p:txBody>
@@ -5334,21 +7812,21 @@
             <a:pPr lvl="0"/>
             <a:r>
               <a:rPr/>
-              <a:t>데이터 정제: 결측값 제거</a:t>
+              <a:t>정제: 결측값 제거</a:t>
             </a:r>
           </a:p>
           <a:p>
             <a:pPr lvl="0"/>
             <a:r>
               <a:rPr/>
-              <a:t>시각화: 히스토그램, KDE, 박스/바이올린, 산점도, 페어플롯, 히트맵 등</a:t>
+              <a:t>시각화: 히스토그램, KDE, 산점도, 페어플롯, 박스/바이올린, 히트맵 등</a:t>
             </a:r>
           </a:p>
           <a:p>
             <a:pPr lvl="0"/>
             <a:r>
               <a:rPr/>
-              <a:t>표: 교차표(species x island), 피봇(섬 x 종 평균 체중)</a:t>
+              <a:t>표: 교차표(species × island), 피봇(섬 × 종 평균 체중)</a:t>
             </a:r>
           </a:p>
         </p:txBody>
@@ -5395,7 +7873,7 @@
             </a:pPr>
             <a:r>
               <a:rPr/>
-              <a:t>교차표: species x island</a:t>
+              <a:t>6. 교차표: 종 × 섬</a:t>
             </a:r>
           </a:p>
         </p:txBody>
@@ -5437,7 +7915,7 @@
                       </a:pPr>
                       <a:r>
                         <a:rPr/>
-                        <a:t>species</a:t>
+                        <a:t>종</a:t>
                       </a:r>
                     </a:p>
                   </a:txBody>
@@ -5724,7 +8202,7 @@
             </a:pPr>
             <a:r>
               <a:rPr/>
-              <a:t>설명: 종별로 특정 섬에 편중된 표본 분포가 관측됩니다. 보전 및 추가 표본설계 시 참고하세요.</a:t>
+              <a:t>설명: 종별 표본이 특정 섬에 편중되어 있습니다.</a:t>
             </a:r>
           </a:p>
         </p:txBody>
@@ -5771,7 +8249,7 @@
             </a:pPr>
             <a:r>
               <a:rPr/>
-              <a:t>피봇테이블: 섬 x 종 평균 체중</a:t>
+              <a:t>7. 피봇테이블: 섬 × 종 평균 체중</a:t>
             </a:r>
           </a:p>
         </p:txBody>
@@ -5813,7 +8291,7 @@
                       </a:pPr>
                       <a:r>
                         <a:rPr/>
-                        <a:t>island</a:t>
+                        <a:t>섬</a:t>
                       </a:r>
                     </a:p>
                   </a:txBody>

</xml_diff>